<commit_message>
updates to DB and Presentation
</commit_message>
<xml_diff>
--- a/GLAPS Presentation.pptx
+++ b/GLAPS Presentation.pptx
@@ -4,6 +4,12 @@
   <p:sldMasterIdLst>
     <p:sldMasterId id="2147483648" r:id="rId1"/>
   </p:sldMasterIdLst>
+  <p:notesMasterIdLst>
+    <p:notesMasterId r:id="rId11"/>
+  </p:notesMasterIdLst>
+  <p:handoutMasterIdLst>
+    <p:handoutMasterId r:id="rId12"/>
+  </p:handoutMasterIdLst>
   <p:sldIdLst>
     <p:sldId id="256" r:id="rId2"/>
     <p:sldId id="257" r:id="rId3"/>
@@ -11,6 +17,9 @@
     <p:sldId id="260" r:id="rId5"/>
     <p:sldId id="261" r:id="rId6"/>
     <p:sldId id="262" r:id="rId7"/>
+    <p:sldId id="263" r:id="rId8"/>
+    <p:sldId id="264" r:id="rId9"/>
+    <p:sldId id="265" r:id="rId10"/>
   </p:sldIdLst>
   <p:sldSz cx="12192000" cy="6858000"/>
   <p:notesSz cx="6858000" cy="9144000"/>
@@ -117,6 +126,1228 @@
 </p:presentation>
 </file>
 
+<file path=ppt/commentAuthors.xml><?xml version="1.0" encoding="utf-8"?>
+<p:cmAuthorLst xmlns:a="http://schemas.openxmlformats.org/drawingml/2006/main" xmlns:r="http://schemas.openxmlformats.org/officeDocument/2006/relationships" xmlns:p="http://schemas.openxmlformats.org/presentationml/2006/main">
+  <p:cmAuthor id="1" name="gmastorg" initials="g" lastIdx="1" clrIdx="0">
+    <p:extLst>
+      <p:ext uri="{19B8F6BF-5375-455C-9EA6-DF929625EA0E}">
+        <p15:presenceInfo xmlns:p15="http://schemas.microsoft.com/office/powerpoint/2012/main" userId="gmastorg" providerId="None"/>
+      </p:ext>
+    </p:extLst>
+  </p:cmAuthor>
+</p:cmAuthorLst>
+</file>
+
+<file path=ppt/handoutMasters/handoutMaster1.xml><?xml version="1.0" encoding="utf-8"?>
+<p:handoutMaster xmlns:a="http://schemas.openxmlformats.org/drawingml/2006/main" xmlns:r="http://schemas.openxmlformats.org/officeDocument/2006/relationships" xmlns:p="http://schemas.openxmlformats.org/presentationml/2006/main">
+  <p:cSld>
+    <p:bg>
+      <p:bgRef idx="1001">
+        <a:schemeClr val="bg1"/>
+      </p:bgRef>
+    </p:bg>
+    <p:spTree>
+      <p:nvGrpSpPr>
+        <p:cNvPr id="1" name=""/>
+        <p:cNvGrpSpPr/>
+        <p:nvPr/>
+      </p:nvGrpSpPr>
+      <p:grpSpPr>
+        <a:xfrm>
+          <a:off x="0" y="0"/>
+          <a:ext cx="0" cy="0"/>
+          <a:chOff x="0" y="0"/>
+          <a:chExt cx="0" cy="0"/>
+        </a:xfrm>
+      </p:grpSpPr>
+      <p:sp>
+        <p:nvSpPr>
+          <p:cNvPr id="2" name="Header Placeholder 1">
+            <a:extLst>
+              <a:ext uri="{FF2B5EF4-FFF2-40B4-BE49-F238E27FC236}">
+                <a16:creationId xmlns:a16="http://schemas.microsoft.com/office/drawing/2014/main" id="{428E3DB5-724A-43F7-954F-C2FF10D1C6E4}"/>
+              </a:ext>
+            </a:extLst>
+          </p:cNvPr>
+          <p:cNvSpPr>
+            <a:spLocks noGrp="1"/>
+          </p:cNvSpPr>
+          <p:nvPr>
+            <p:ph type="hdr" sz="quarter"/>
+          </p:nvPr>
+        </p:nvSpPr>
+        <p:spPr>
+          <a:xfrm>
+            <a:off x="0" y="0"/>
+            <a:ext cx="2971800" cy="458788"/>
+          </a:xfrm>
+          <a:prstGeom prst="rect">
+            <a:avLst/>
+          </a:prstGeom>
+        </p:spPr>
+        <p:txBody>
+          <a:bodyPr vert="horz" lIns="91440" tIns="45720" rIns="91440" bIns="45720" rtlCol="0"/>
+          <a:lstStyle>
+            <a:lvl1pPr algn="l">
+              <a:defRPr sz="1200"/>
+            </a:lvl1pPr>
+          </a:lstStyle>
+          <a:p>
+            <a:endParaRPr lang="en-US"/>
+          </a:p>
+        </p:txBody>
+      </p:sp>
+      <p:sp>
+        <p:nvSpPr>
+          <p:cNvPr id="3" name="Date Placeholder 2">
+            <a:extLst>
+              <a:ext uri="{FF2B5EF4-FFF2-40B4-BE49-F238E27FC236}">
+                <a16:creationId xmlns:a16="http://schemas.microsoft.com/office/drawing/2014/main" id="{F83BBF70-F4C4-4262-91E2-2BDAC60108F8}"/>
+              </a:ext>
+            </a:extLst>
+          </p:cNvPr>
+          <p:cNvSpPr>
+            <a:spLocks noGrp="1"/>
+          </p:cNvSpPr>
+          <p:nvPr>
+            <p:ph type="dt" sz="quarter" idx="1"/>
+          </p:nvPr>
+        </p:nvSpPr>
+        <p:spPr>
+          <a:xfrm>
+            <a:off x="3884613" y="0"/>
+            <a:ext cx="2971800" cy="458788"/>
+          </a:xfrm>
+          <a:prstGeom prst="rect">
+            <a:avLst/>
+          </a:prstGeom>
+        </p:spPr>
+        <p:txBody>
+          <a:bodyPr vert="horz" lIns="91440" tIns="45720" rIns="91440" bIns="45720" rtlCol="0"/>
+          <a:lstStyle>
+            <a:lvl1pPr algn="r">
+              <a:defRPr sz="1200"/>
+            </a:lvl1pPr>
+          </a:lstStyle>
+          <a:p>
+            <a:fld id="{8FF841A4-3D2F-4A04-8AFD-039DB6C706EF}" type="datetimeFigureOut">
+              <a:rPr lang="en-US" smtClean="0"/>
+              <a:t>3/6/2019</a:t>
+            </a:fld>
+            <a:endParaRPr lang="en-US"/>
+          </a:p>
+        </p:txBody>
+      </p:sp>
+      <p:sp>
+        <p:nvSpPr>
+          <p:cNvPr id="4" name="Footer Placeholder 3">
+            <a:extLst>
+              <a:ext uri="{FF2B5EF4-FFF2-40B4-BE49-F238E27FC236}">
+                <a16:creationId xmlns:a16="http://schemas.microsoft.com/office/drawing/2014/main" id="{1E0C038D-EF95-4834-80C6-A1CC22F8B18A}"/>
+              </a:ext>
+            </a:extLst>
+          </p:cNvPr>
+          <p:cNvSpPr>
+            <a:spLocks noGrp="1"/>
+          </p:cNvSpPr>
+          <p:nvPr>
+            <p:ph type="ftr" sz="quarter" idx="2"/>
+          </p:nvPr>
+        </p:nvSpPr>
+        <p:spPr>
+          <a:xfrm>
+            <a:off x="0" y="8685213"/>
+            <a:ext cx="2971800" cy="458787"/>
+          </a:xfrm>
+          <a:prstGeom prst="rect">
+            <a:avLst/>
+          </a:prstGeom>
+        </p:spPr>
+        <p:txBody>
+          <a:bodyPr vert="horz" lIns="91440" tIns="45720" rIns="91440" bIns="45720" rtlCol="0" anchor="b"/>
+          <a:lstStyle>
+            <a:lvl1pPr algn="l">
+              <a:defRPr sz="1200"/>
+            </a:lvl1pPr>
+          </a:lstStyle>
+          <a:p>
+            <a:endParaRPr lang="en-US"/>
+          </a:p>
+        </p:txBody>
+      </p:sp>
+      <p:sp>
+        <p:nvSpPr>
+          <p:cNvPr id="5" name="Slide Number Placeholder 4">
+            <a:extLst>
+              <a:ext uri="{FF2B5EF4-FFF2-40B4-BE49-F238E27FC236}">
+                <a16:creationId xmlns:a16="http://schemas.microsoft.com/office/drawing/2014/main" id="{3F773147-9FA7-4E13-8096-18BACF02428E}"/>
+              </a:ext>
+            </a:extLst>
+          </p:cNvPr>
+          <p:cNvSpPr>
+            <a:spLocks noGrp="1"/>
+          </p:cNvSpPr>
+          <p:nvPr>
+            <p:ph type="sldNum" sz="quarter" idx="3"/>
+          </p:nvPr>
+        </p:nvSpPr>
+        <p:spPr>
+          <a:xfrm>
+            <a:off x="3884613" y="8685213"/>
+            <a:ext cx="2971800" cy="458787"/>
+          </a:xfrm>
+          <a:prstGeom prst="rect">
+            <a:avLst/>
+          </a:prstGeom>
+        </p:spPr>
+        <p:txBody>
+          <a:bodyPr vert="horz" lIns="91440" tIns="45720" rIns="91440" bIns="45720" rtlCol="0" anchor="b"/>
+          <a:lstStyle>
+            <a:lvl1pPr algn="r">
+              <a:defRPr sz="1200"/>
+            </a:lvl1pPr>
+          </a:lstStyle>
+          <a:p>
+            <a:fld id="{4044765D-0AB6-40B1-A440-37AD327588CE}" type="slidenum">
+              <a:rPr lang="en-US" smtClean="0"/>
+              <a:t>‹#›</a:t>
+            </a:fld>
+            <a:endParaRPr lang="en-US"/>
+          </a:p>
+        </p:txBody>
+      </p:sp>
+    </p:spTree>
+    <p:extLst>
+      <p:ext uri="{BB962C8B-B14F-4D97-AF65-F5344CB8AC3E}">
+        <p14:creationId xmlns:p14="http://schemas.microsoft.com/office/powerpoint/2010/main" val="2411605362"/>
+      </p:ext>
+    </p:extLst>
+  </p:cSld>
+  <p:clrMap bg1="lt1" tx1="dk1" bg2="lt2" tx2="dk2" accent1="accent1" accent2="accent2" accent3="accent3" accent4="accent4" accent5="accent5" accent6="accent6" hlink="hlink" folHlink="folHlink"/>
+</p:handoutMaster>
+</file>
+
+<file path=ppt/notesMasters/notesMaster1.xml><?xml version="1.0" encoding="utf-8"?>
+<p:notesMaster xmlns:a="http://schemas.openxmlformats.org/drawingml/2006/main" xmlns:r="http://schemas.openxmlformats.org/officeDocument/2006/relationships" xmlns:p="http://schemas.openxmlformats.org/presentationml/2006/main">
+  <p:cSld>
+    <p:bg>
+      <p:bgRef idx="1001">
+        <a:schemeClr val="bg1"/>
+      </p:bgRef>
+    </p:bg>
+    <p:spTree>
+      <p:nvGrpSpPr>
+        <p:cNvPr id="1" name=""/>
+        <p:cNvGrpSpPr/>
+        <p:nvPr/>
+      </p:nvGrpSpPr>
+      <p:grpSpPr>
+        <a:xfrm>
+          <a:off x="0" y="0"/>
+          <a:ext cx="0" cy="0"/>
+          <a:chOff x="0" y="0"/>
+          <a:chExt cx="0" cy="0"/>
+        </a:xfrm>
+      </p:grpSpPr>
+      <p:sp>
+        <p:nvSpPr>
+          <p:cNvPr id="2" name="Header Placeholder 1"/>
+          <p:cNvSpPr>
+            <a:spLocks noGrp="1"/>
+          </p:cNvSpPr>
+          <p:nvPr>
+            <p:ph type="hdr" sz="quarter"/>
+          </p:nvPr>
+        </p:nvSpPr>
+        <p:spPr>
+          <a:xfrm>
+            <a:off x="0" y="0"/>
+            <a:ext cx="2971800" cy="458788"/>
+          </a:xfrm>
+          <a:prstGeom prst="rect">
+            <a:avLst/>
+          </a:prstGeom>
+        </p:spPr>
+        <p:txBody>
+          <a:bodyPr vert="horz" lIns="91440" tIns="45720" rIns="91440" bIns="45720" rtlCol="0"/>
+          <a:lstStyle>
+            <a:lvl1pPr algn="l">
+              <a:defRPr sz="1200"/>
+            </a:lvl1pPr>
+          </a:lstStyle>
+          <a:p>
+            <a:endParaRPr lang="en-US"/>
+          </a:p>
+        </p:txBody>
+      </p:sp>
+      <p:sp>
+        <p:nvSpPr>
+          <p:cNvPr id="3" name="Date Placeholder 2"/>
+          <p:cNvSpPr>
+            <a:spLocks noGrp="1"/>
+          </p:cNvSpPr>
+          <p:nvPr>
+            <p:ph type="dt" idx="1"/>
+          </p:nvPr>
+        </p:nvSpPr>
+        <p:spPr>
+          <a:xfrm>
+            <a:off x="3884613" y="0"/>
+            <a:ext cx="2971800" cy="458788"/>
+          </a:xfrm>
+          <a:prstGeom prst="rect">
+            <a:avLst/>
+          </a:prstGeom>
+        </p:spPr>
+        <p:txBody>
+          <a:bodyPr vert="horz" lIns="91440" tIns="45720" rIns="91440" bIns="45720" rtlCol="0"/>
+          <a:lstStyle>
+            <a:lvl1pPr algn="r">
+              <a:defRPr sz="1200"/>
+            </a:lvl1pPr>
+          </a:lstStyle>
+          <a:p>
+            <a:fld id="{7C9A4655-0732-4CEF-977A-603CB38877C2}" type="datetimeFigureOut">
+              <a:rPr lang="en-US" smtClean="0"/>
+              <a:t>3/6/2019</a:t>
+            </a:fld>
+            <a:endParaRPr lang="en-US"/>
+          </a:p>
+        </p:txBody>
+      </p:sp>
+      <p:sp>
+        <p:nvSpPr>
+          <p:cNvPr id="4" name="Slide Image Placeholder 3"/>
+          <p:cNvSpPr>
+            <a:spLocks noGrp="1" noRot="1" noChangeAspect="1"/>
+          </p:cNvSpPr>
+          <p:nvPr>
+            <p:ph type="sldImg" idx="2"/>
+          </p:nvPr>
+        </p:nvSpPr>
+        <p:spPr>
+          <a:xfrm>
+            <a:off x="685800" y="1143000"/>
+            <a:ext cx="5486400" cy="3086100"/>
+          </a:xfrm>
+          <a:prstGeom prst="rect">
+            <a:avLst/>
+          </a:prstGeom>
+          <a:noFill/>
+          <a:ln w="12700">
+            <a:solidFill>
+              <a:prstClr val="black"/>
+            </a:solidFill>
+          </a:ln>
+        </p:spPr>
+        <p:txBody>
+          <a:bodyPr vert="horz" lIns="91440" tIns="45720" rIns="91440" bIns="45720" rtlCol="0" anchor="ctr"/>
+          <a:lstStyle/>
+          <a:p>
+            <a:endParaRPr lang="en-US"/>
+          </a:p>
+        </p:txBody>
+      </p:sp>
+      <p:sp>
+        <p:nvSpPr>
+          <p:cNvPr id="5" name="Notes Placeholder 4"/>
+          <p:cNvSpPr>
+            <a:spLocks noGrp="1"/>
+          </p:cNvSpPr>
+          <p:nvPr>
+            <p:ph type="body" sz="quarter" idx="3"/>
+          </p:nvPr>
+        </p:nvSpPr>
+        <p:spPr>
+          <a:xfrm>
+            <a:off x="685800" y="4400550"/>
+            <a:ext cx="5486400" cy="3600450"/>
+          </a:xfrm>
+          <a:prstGeom prst="rect">
+            <a:avLst/>
+          </a:prstGeom>
+        </p:spPr>
+        <p:txBody>
+          <a:bodyPr vert="horz" lIns="91440" tIns="45720" rIns="91440" bIns="45720" rtlCol="0"/>
+          <a:lstStyle/>
+          <a:p>
+            <a:pPr lvl="0"/>
+            <a:r>
+              <a:rPr lang="en-US"/>
+              <a:t>Edit Master text styles</a:t>
+            </a:r>
+          </a:p>
+          <a:p>
+            <a:pPr lvl="1"/>
+            <a:r>
+              <a:rPr lang="en-US"/>
+              <a:t>Second level</a:t>
+            </a:r>
+          </a:p>
+          <a:p>
+            <a:pPr lvl="2"/>
+            <a:r>
+              <a:rPr lang="en-US"/>
+              <a:t>Third level</a:t>
+            </a:r>
+          </a:p>
+          <a:p>
+            <a:pPr lvl="3"/>
+            <a:r>
+              <a:rPr lang="en-US"/>
+              <a:t>Fourth level</a:t>
+            </a:r>
+          </a:p>
+          <a:p>
+            <a:pPr lvl="4"/>
+            <a:r>
+              <a:rPr lang="en-US"/>
+              <a:t>Fifth level</a:t>
+            </a:r>
+          </a:p>
+        </p:txBody>
+      </p:sp>
+      <p:sp>
+        <p:nvSpPr>
+          <p:cNvPr id="6" name="Footer Placeholder 5"/>
+          <p:cNvSpPr>
+            <a:spLocks noGrp="1"/>
+          </p:cNvSpPr>
+          <p:nvPr>
+            <p:ph type="ftr" sz="quarter" idx="4"/>
+          </p:nvPr>
+        </p:nvSpPr>
+        <p:spPr>
+          <a:xfrm>
+            <a:off x="0" y="8685213"/>
+            <a:ext cx="2971800" cy="458787"/>
+          </a:xfrm>
+          <a:prstGeom prst="rect">
+            <a:avLst/>
+          </a:prstGeom>
+        </p:spPr>
+        <p:txBody>
+          <a:bodyPr vert="horz" lIns="91440" tIns="45720" rIns="91440" bIns="45720" rtlCol="0" anchor="b"/>
+          <a:lstStyle>
+            <a:lvl1pPr algn="l">
+              <a:defRPr sz="1200"/>
+            </a:lvl1pPr>
+          </a:lstStyle>
+          <a:p>
+            <a:endParaRPr lang="en-US"/>
+          </a:p>
+        </p:txBody>
+      </p:sp>
+      <p:sp>
+        <p:nvSpPr>
+          <p:cNvPr id="7" name="Slide Number Placeholder 6"/>
+          <p:cNvSpPr>
+            <a:spLocks noGrp="1"/>
+          </p:cNvSpPr>
+          <p:nvPr>
+            <p:ph type="sldNum" sz="quarter" idx="5"/>
+          </p:nvPr>
+        </p:nvSpPr>
+        <p:spPr>
+          <a:xfrm>
+            <a:off x="3884613" y="8685213"/>
+            <a:ext cx="2971800" cy="458787"/>
+          </a:xfrm>
+          <a:prstGeom prst="rect">
+            <a:avLst/>
+          </a:prstGeom>
+        </p:spPr>
+        <p:txBody>
+          <a:bodyPr vert="horz" lIns="91440" tIns="45720" rIns="91440" bIns="45720" rtlCol="0" anchor="b"/>
+          <a:lstStyle>
+            <a:lvl1pPr algn="r">
+              <a:defRPr sz="1200"/>
+            </a:lvl1pPr>
+          </a:lstStyle>
+          <a:p>
+            <a:fld id="{53D823F5-FDDD-4E6F-9CBC-770E77BAD144}" type="slidenum">
+              <a:rPr lang="en-US" smtClean="0"/>
+              <a:t>‹#›</a:t>
+            </a:fld>
+            <a:endParaRPr lang="en-US"/>
+          </a:p>
+        </p:txBody>
+      </p:sp>
+    </p:spTree>
+    <p:extLst>
+      <p:ext uri="{BB962C8B-B14F-4D97-AF65-F5344CB8AC3E}">
+        <p14:creationId xmlns:p14="http://schemas.microsoft.com/office/powerpoint/2010/main" val="1029996474"/>
+      </p:ext>
+    </p:extLst>
+  </p:cSld>
+  <p:clrMap bg1="lt1" tx1="dk1" bg2="lt2" tx2="dk2" accent1="accent1" accent2="accent2" accent3="accent3" accent4="accent4" accent5="accent5" accent6="accent6" hlink="hlink" folHlink="folHlink"/>
+  <p:notesStyle>
+    <a:lvl1pPr marL="0" algn="l" defTabSz="914400" rtl="0" eaLnBrk="1" latinLnBrk="0" hangingPunct="1">
+      <a:defRPr sz="1200" kern="1200">
+        <a:solidFill>
+          <a:schemeClr val="tx1"/>
+        </a:solidFill>
+        <a:latin typeface="+mn-lt"/>
+        <a:ea typeface="+mn-ea"/>
+        <a:cs typeface="+mn-cs"/>
+      </a:defRPr>
+    </a:lvl1pPr>
+    <a:lvl2pPr marL="457200" algn="l" defTabSz="914400" rtl="0" eaLnBrk="1" latinLnBrk="0" hangingPunct="1">
+      <a:defRPr sz="1200" kern="1200">
+        <a:solidFill>
+          <a:schemeClr val="tx1"/>
+        </a:solidFill>
+        <a:latin typeface="+mn-lt"/>
+        <a:ea typeface="+mn-ea"/>
+        <a:cs typeface="+mn-cs"/>
+      </a:defRPr>
+    </a:lvl2pPr>
+    <a:lvl3pPr marL="914400" algn="l" defTabSz="914400" rtl="0" eaLnBrk="1" latinLnBrk="0" hangingPunct="1">
+      <a:defRPr sz="1200" kern="1200">
+        <a:solidFill>
+          <a:schemeClr val="tx1"/>
+        </a:solidFill>
+        <a:latin typeface="+mn-lt"/>
+        <a:ea typeface="+mn-ea"/>
+        <a:cs typeface="+mn-cs"/>
+      </a:defRPr>
+    </a:lvl3pPr>
+    <a:lvl4pPr marL="1371600" algn="l" defTabSz="914400" rtl="0" eaLnBrk="1" latinLnBrk="0" hangingPunct="1">
+      <a:defRPr sz="1200" kern="1200">
+        <a:solidFill>
+          <a:schemeClr val="tx1"/>
+        </a:solidFill>
+        <a:latin typeface="+mn-lt"/>
+        <a:ea typeface="+mn-ea"/>
+        <a:cs typeface="+mn-cs"/>
+      </a:defRPr>
+    </a:lvl4pPr>
+    <a:lvl5pPr marL="1828800" algn="l" defTabSz="914400" rtl="0" eaLnBrk="1" latinLnBrk="0" hangingPunct="1">
+      <a:defRPr sz="1200" kern="1200">
+        <a:solidFill>
+          <a:schemeClr val="tx1"/>
+        </a:solidFill>
+        <a:latin typeface="+mn-lt"/>
+        <a:ea typeface="+mn-ea"/>
+        <a:cs typeface="+mn-cs"/>
+      </a:defRPr>
+    </a:lvl5pPr>
+    <a:lvl6pPr marL="2286000" algn="l" defTabSz="914400" rtl="0" eaLnBrk="1" latinLnBrk="0" hangingPunct="1">
+      <a:defRPr sz="1200" kern="1200">
+        <a:solidFill>
+          <a:schemeClr val="tx1"/>
+        </a:solidFill>
+        <a:latin typeface="+mn-lt"/>
+        <a:ea typeface="+mn-ea"/>
+        <a:cs typeface="+mn-cs"/>
+      </a:defRPr>
+    </a:lvl6pPr>
+    <a:lvl7pPr marL="2743200" algn="l" defTabSz="914400" rtl="0" eaLnBrk="1" latinLnBrk="0" hangingPunct="1">
+      <a:defRPr sz="1200" kern="1200">
+        <a:solidFill>
+          <a:schemeClr val="tx1"/>
+        </a:solidFill>
+        <a:latin typeface="+mn-lt"/>
+        <a:ea typeface="+mn-ea"/>
+        <a:cs typeface="+mn-cs"/>
+      </a:defRPr>
+    </a:lvl7pPr>
+    <a:lvl8pPr marL="3200400" algn="l" defTabSz="914400" rtl="0" eaLnBrk="1" latinLnBrk="0" hangingPunct="1">
+      <a:defRPr sz="1200" kern="1200">
+        <a:solidFill>
+          <a:schemeClr val="tx1"/>
+        </a:solidFill>
+        <a:latin typeface="+mn-lt"/>
+        <a:ea typeface="+mn-ea"/>
+        <a:cs typeface="+mn-cs"/>
+      </a:defRPr>
+    </a:lvl8pPr>
+    <a:lvl9pPr marL="3657600" algn="l" defTabSz="914400" rtl="0" eaLnBrk="1" latinLnBrk="0" hangingPunct="1">
+      <a:defRPr sz="1200" kern="1200">
+        <a:solidFill>
+          <a:schemeClr val="tx1"/>
+        </a:solidFill>
+        <a:latin typeface="+mn-lt"/>
+        <a:ea typeface="+mn-ea"/>
+        <a:cs typeface="+mn-cs"/>
+      </a:defRPr>
+    </a:lvl9pPr>
+  </p:notesStyle>
+</p:notesMaster>
+</file>
+
+<file path=ppt/notesSlides/notesSlide1.xml><?xml version="1.0" encoding="utf-8"?>
+<p:notes xmlns:a="http://schemas.openxmlformats.org/drawingml/2006/main" xmlns:r="http://schemas.openxmlformats.org/officeDocument/2006/relationships" xmlns:p="http://schemas.openxmlformats.org/presentationml/2006/main">
+  <p:cSld>
+    <p:spTree>
+      <p:nvGrpSpPr>
+        <p:cNvPr id="1" name=""/>
+        <p:cNvGrpSpPr/>
+        <p:nvPr/>
+      </p:nvGrpSpPr>
+      <p:grpSpPr>
+        <a:xfrm>
+          <a:off x="0" y="0"/>
+          <a:ext cx="0" cy="0"/>
+          <a:chOff x="0" y="0"/>
+          <a:chExt cx="0" cy="0"/>
+        </a:xfrm>
+      </p:grpSpPr>
+      <p:sp>
+        <p:nvSpPr>
+          <p:cNvPr id="2" name="Slide Image Placeholder 1"/>
+          <p:cNvSpPr>
+            <a:spLocks noGrp="1" noRot="1" noChangeAspect="1"/>
+          </p:cNvSpPr>
+          <p:nvPr>
+            <p:ph type="sldImg"/>
+          </p:nvPr>
+        </p:nvSpPr>
+        <p:spPr/>
+      </p:sp>
+      <p:sp>
+        <p:nvSpPr>
+          <p:cNvPr id="3" name="Notes Placeholder 2"/>
+          <p:cNvSpPr>
+            <a:spLocks noGrp="1"/>
+          </p:cNvSpPr>
+          <p:nvPr>
+            <p:ph type="body" idx="1"/>
+          </p:nvPr>
+        </p:nvSpPr>
+        <p:spPr/>
+        <p:txBody>
+          <a:bodyPr/>
+          <a:lstStyle/>
+          <a:p>
+            <a:endParaRPr lang="en-US"/>
+          </a:p>
+        </p:txBody>
+      </p:sp>
+      <p:sp>
+        <p:nvSpPr>
+          <p:cNvPr id="4" name="Slide Number Placeholder 3"/>
+          <p:cNvSpPr>
+            <a:spLocks noGrp="1"/>
+          </p:cNvSpPr>
+          <p:nvPr>
+            <p:ph type="sldNum" sz="quarter" idx="5"/>
+          </p:nvPr>
+        </p:nvSpPr>
+        <p:spPr/>
+        <p:txBody>
+          <a:bodyPr/>
+          <a:lstStyle/>
+          <a:p>
+            <a:fld id="{53D823F5-FDDD-4E6F-9CBC-770E77BAD144}" type="slidenum">
+              <a:rPr lang="en-US" smtClean="0"/>
+              <a:t>1</a:t>
+            </a:fld>
+            <a:endParaRPr lang="en-US"/>
+          </a:p>
+        </p:txBody>
+      </p:sp>
+    </p:spTree>
+    <p:extLst>
+      <p:ext uri="{BB962C8B-B14F-4D97-AF65-F5344CB8AC3E}">
+        <p14:creationId xmlns:p14="http://schemas.microsoft.com/office/powerpoint/2010/main" val="1409690501"/>
+      </p:ext>
+    </p:extLst>
+  </p:cSld>
+  <p:clrMapOvr>
+    <a:masterClrMapping/>
+  </p:clrMapOvr>
+</p:notes>
+</file>
+
+<file path=ppt/notesSlides/notesSlide2.xml><?xml version="1.0" encoding="utf-8"?>
+<p:notes xmlns:a="http://schemas.openxmlformats.org/drawingml/2006/main" xmlns:r="http://schemas.openxmlformats.org/officeDocument/2006/relationships" xmlns:p="http://schemas.openxmlformats.org/presentationml/2006/main">
+  <p:cSld>
+    <p:spTree>
+      <p:nvGrpSpPr>
+        <p:cNvPr id="1" name=""/>
+        <p:cNvGrpSpPr/>
+        <p:nvPr/>
+      </p:nvGrpSpPr>
+      <p:grpSpPr>
+        <a:xfrm>
+          <a:off x="0" y="0"/>
+          <a:ext cx="0" cy="0"/>
+          <a:chOff x="0" y="0"/>
+          <a:chExt cx="0" cy="0"/>
+        </a:xfrm>
+      </p:grpSpPr>
+      <p:sp>
+        <p:nvSpPr>
+          <p:cNvPr id="2" name="Slide Image Placeholder 1"/>
+          <p:cNvSpPr>
+            <a:spLocks noGrp="1" noRot="1" noChangeAspect="1"/>
+          </p:cNvSpPr>
+          <p:nvPr>
+            <p:ph type="sldImg"/>
+          </p:nvPr>
+        </p:nvSpPr>
+        <p:spPr/>
+      </p:sp>
+      <p:sp>
+        <p:nvSpPr>
+          <p:cNvPr id="3" name="Notes Placeholder 2"/>
+          <p:cNvSpPr>
+            <a:spLocks noGrp="1"/>
+          </p:cNvSpPr>
+          <p:nvPr>
+            <p:ph type="body" idx="1"/>
+          </p:nvPr>
+        </p:nvSpPr>
+        <p:spPr/>
+        <p:txBody>
+          <a:bodyPr/>
+          <a:lstStyle/>
+          <a:p>
+            <a:endParaRPr lang="en-US"/>
+          </a:p>
+        </p:txBody>
+      </p:sp>
+      <p:sp>
+        <p:nvSpPr>
+          <p:cNvPr id="4" name="Slide Number Placeholder 3"/>
+          <p:cNvSpPr>
+            <a:spLocks noGrp="1"/>
+          </p:cNvSpPr>
+          <p:nvPr>
+            <p:ph type="sldNum" sz="quarter" idx="5"/>
+          </p:nvPr>
+        </p:nvSpPr>
+        <p:spPr/>
+        <p:txBody>
+          <a:bodyPr/>
+          <a:lstStyle/>
+          <a:p>
+            <a:fld id="{53D823F5-FDDD-4E6F-9CBC-770E77BAD144}" type="slidenum">
+              <a:rPr lang="en-US" smtClean="0"/>
+              <a:t>2</a:t>
+            </a:fld>
+            <a:endParaRPr lang="en-US"/>
+          </a:p>
+        </p:txBody>
+      </p:sp>
+    </p:spTree>
+    <p:extLst>
+      <p:ext uri="{BB962C8B-B14F-4D97-AF65-F5344CB8AC3E}">
+        <p14:creationId xmlns:p14="http://schemas.microsoft.com/office/powerpoint/2010/main" val="1682738024"/>
+      </p:ext>
+    </p:extLst>
+  </p:cSld>
+  <p:clrMapOvr>
+    <a:masterClrMapping/>
+  </p:clrMapOvr>
+</p:notes>
+</file>
+
+<file path=ppt/notesSlides/notesSlide3.xml><?xml version="1.0" encoding="utf-8"?>
+<p:notes xmlns:a="http://schemas.openxmlformats.org/drawingml/2006/main" xmlns:r="http://schemas.openxmlformats.org/officeDocument/2006/relationships" xmlns:p="http://schemas.openxmlformats.org/presentationml/2006/main">
+  <p:cSld>
+    <p:spTree>
+      <p:nvGrpSpPr>
+        <p:cNvPr id="1" name=""/>
+        <p:cNvGrpSpPr/>
+        <p:nvPr/>
+      </p:nvGrpSpPr>
+      <p:grpSpPr>
+        <a:xfrm>
+          <a:off x="0" y="0"/>
+          <a:ext cx="0" cy="0"/>
+          <a:chOff x="0" y="0"/>
+          <a:chExt cx="0" cy="0"/>
+        </a:xfrm>
+      </p:grpSpPr>
+      <p:sp>
+        <p:nvSpPr>
+          <p:cNvPr id="2" name="Slide Image Placeholder 1"/>
+          <p:cNvSpPr>
+            <a:spLocks noGrp="1" noRot="1" noChangeAspect="1"/>
+          </p:cNvSpPr>
+          <p:nvPr>
+            <p:ph type="sldImg"/>
+          </p:nvPr>
+        </p:nvSpPr>
+        <p:spPr/>
+      </p:sp>
+      <p:sp>
+        <p:nvSpPr>
+          <p:cNvPr id="3" name="Notes Placeholder 2"/>
+          <p:cNvSpPr>
+            <a:spLocks noGrp="1"/>
+          </p:cNvSpPr>
+          <p:nvPr>
+            <p:ph type="body" idx="1"/>
+          </p:nvPr>
+        </p:nvSpPr>
+        <p:spPr/>
+        <p:txBody>
+          <a:bodyPr/>
+          <a:lstStyle/>
+          <a:p>
+            <a:endParaRPr lang="en-US" dirty="0"/>
+          </a:p>
+        </p:txBody>
+      </p:sp>
+      <p:sp>
+        <p:nvSpPr>
+          <p:cNvPr id="4" name="Slide Number Placeholder 3"/>
+          <p:cNvSpPr>
+            <a:spLocks noGrp="1"/>
+          </p:cNvSpPr>
+          <p:nvPr>
+            <p:ph type="sldNum" sz="quarter" idx="5"/>
+          </p:nvPr>
+        </p:nvSpPr>
+        <p:spPr/>
+        <p:txBody>
+          <a:bodyPr/>
+          <a:lstStyle/>
+          <a:p>
+            <a:fld id="{53D823F5-FDDD-4E6F-9CBC-770E77BAD144}" type="slidenum">
+              <a:rPr lang="en-US" smtClean="0"/>
+              <a:t>3</a:t>
+            </a:fld>
+            <a:endParaRPr lang="en-US"/>
+          </a:p>
+        </p:txBody>
+      </p:sp>
+    </p:spTree>
+    <p:extLst>
+      <p:ext uri="{BB962C8B-B14F-4D97-AF65-F5344CB8AC3E}">
+        <p14:creationId xmlns:p14="http://schemas.microsoft.com/office/powerpoint/2010/main" val="3379963089"/>
+      </p:ext>
+    </p:extLst>
+  </p:cSld>
+  <p:clrMapOvr>
+    <a:masterClrMapping/>
+  </p:clrMapOvr>
+</p:notes>
+</file>
+
+<file path=ppt/notesSlides/notesSlide4.xml><?xml version="1.0" encoding="utf-8"?>
+<p:notes xmlns:a="http://schemas.openxmlformats.org/drawingml/2006/main" xmlns:r="http://schemas.openxmlformats.org/officeDocument/2006/relationships" xmlns:p="http://schemas.openxmlformats.org/presentationml/2006/main">
+  <p:cSld>
+    <p:spTree>
+      <p:nvGrpSpPr>
+        <p:cNvPr id="1" name=""/>
+        <p:cNvGrpSpPr/>
+        <p:nvPr/>
+      </p:nvGrpSpPr>
+      <p:grpSpPr>
+        <a:xfrm>
+          <a:off x="0" y="0"/>
+          <a:ext cx="0" cy="0"/>
+          <a:chOff x="0" y="0"/>
+          <a:chExt cx="0" cy="0"/>
+        </a:xfrm>
+      </p:grpSpPr>
+      <p:sp>
+        <p:nvSpPr>
+          <p:cNvPr id="2" name="Slide Image Placeholder 1"/>
+          <p:cNvSpPr>
+            <a:spLocks noGrp="1" noRot="1" noChangeAspect="1"/>
+          </p:cNvSpPr>
+          <p:nvPr>
+            <p:ph type="sldImg"/>
+          </p:nvPr>
+        </p:nvSpPr>
+        <p:spPr/>
+      </p:sp>
+      <p:sp>
+        <p:nvSpPr>
+          <p:cNvPr id="3" name="Notes Placeholder 2"/>
+          <p:cNvSpPr>
+            <a:spLocks noGrp="1"/>
+          </p:cNvSpPr>
+          <p:nvPr>
+            <p:ph type="body" idx="1"/>
+          </p:nvPr>
+        </p:nvSpPr>
+        <p:spPr/>
+        <p:txBody>
+          <a:bodyPr/>
+          <a:lstStyle/>
+          <a:p>
+            <a:endParaRPr lang="en-US"/>
+          </a:p>
+        </p:txBody>
+      </p:sp>
+      <p:sp>
+        <p:nvSpPr>
+          <p:cNvPr id="4" name="Slide Number Placeholder 3"/>
+          <p:cNvSpPr>
+            <a:spLocks noGrp="1"/>
+          </p:cNvSpPr>
+          <p:nvPr>
+            <p:ph type="sldNum" sz="quarter" idx="5"/>
+          </p:nvPr>
+        </p:nvSpPr>
+        <p:spPr/>
+        <p:txBody>
+          <a:bodyPr/>
+          <a:lstStyle/>
+          <a:p>
+            <a:fld id="{53D823F5-FDDD-4E6F-9CBC-770E77BAD144}" type="slidenum">
+              <a:rPr lang="en-US" smtClean="0"/>
+              <a:t>4</a:t>
+            </a:fld>
+            <a:endParaRPr lang="en-US"/>
+          </a:p>
+        </p:txBody>
+      </p:sp>
+    </p:spTree>
+    <p:extLst>
+      <p:ext uri="{BB962C8B-B14F-4D97-AF65-F5344CB8AC3E}">
+        <p14:creationId xmlns:p14="http://schemas.microsoft.com/office/powerpoint/2010/main" val="2240925768"/>
+      </p:ext>
+    </p:extLst>
+  </p:cSld>
+  <p:clrMapOvr>
+    <a:masterClrMapping/>
+  </p:clrMapOvr>
+</p:notes>
+</file>
+
+<file path=ppt/notesSlides/notesSlide5.xml><?xml version="1.0" encoding="utf-8"?>
+<p:notes xmlns:a="http://schemas.openxmlformats.org/drawingml/2006/main" xmlns:r="http://schemas.openxmlformats.org/officeDocument/2006/relationships" xmlns:p="http://schemas.openxmlformats.org/presentationml/2006/main">
+  <p:cSld>
+    <p:spTree>
+      <p:nvGrpSpPr>
+        <p:cNvPr id="1" name=""/>
+        <p:cNvGrpSpPr/>
+        <p:nvPr/>
+      </p:nvGrpSpPr>
+      <p:grpSpPr>
+        <a:xfrm>
+          <a:off x="0" y="0"/>
+          <a:ext cx="0" cy="0"/>
+          <a:chOff x="0" y="0"/>
+          <a:chExt cx="0" cy="0"/>
+        </a:xfrm>
+      </p:grpSpPr>
+      <p:sp>
+        <p:nvSpPr>
+          <p:cNvPr id="2" name="Slide Image Placeholder 1"/>
+          <p:cNvSpPr>
+            <a:spLocks noGrp="1" noRot="1" noChangeAspect="1"/>
+          </p:cNvSpPr>
+          <p:nvPr>
+            <p:ph type="sldImg"/>
+          </p:nvPr>
+        </p:nvSpPr>
+        <p:spPr/>
+      </p:sp>
+      <p:sp>
+        <p:nvSpPr>
+          <p:cNvPr id="3" name="Notes Placeholder 2"/>
+          <p:cNvSpPr>
+            <a:spLocks noGrp="1"/>
+          </p:cNvSpPr>
+          <p:nvPr>
+            <p:ph type="body" idx="1"/>
+          </p:nvPr>
+        </p:nvSpPr>
+        <p:spPr/>
+        <p:txBody>
+          <a:bodyPr/>
+          <a:lstStyle/>
+          <a:p>
+            <a:endParaRPr lang="en-US"/>
+          </a:p>
+        </p:txBody>
+      </p:sp>
+      <p:sp>
+        <p:nvSpPr>
+          <p:cNvPr id="4" name="Slide Number Placeholder 3"/>
+          <p:cNvSpPr>
+            <a:spLocks noGrp="1"/>
+          </p:cNvSpPr>
+          <p:nvPr>
+            <p:ph type="sldNum" sz="quarter" idx="5"/>
+          </p:nvPr>
+        </p:nvSpPr>
+        <p:spPr/>
+        <p:txBody>
+          <a:bodyPr/>
+          <a:lstStyle/>
+          <a:p>
+            <a:fld id="{53D823F5-FDDD-4E6F-9CBC-770E77BAD144}" type="slidenum">
+              <a:rPr lang="en-US" smtClean="0"/>
+              <a:t>5</a:t>
+            </a:fld>
+            <a:endParaRPr lang="en-US"/>
+          </a:p>
+        </p:txBody>
+      </p:sp>
+    </p:spTree>
+    <p:extLst>
+      <p:ext uri="{BB962C8B-B14F-4D97-AF65-F5344CB8AC3E}">
+        <p14:creationId xmlns:p14="http://schemas.microsoft.com/office/powerpoint/2010/main" val="721312342"/>
+      </p:ext>
+    </p:extLst>
+  </p:cSld>
+  <p:clrMapOvr>
+    <a:masterClrMapping/>
+  </p:clrMapOvr>
+</p:notes>
+</file>
+
+<file path=ppt/notesSlides/notesSlide6.xml><?xml version="1.0" encoding="utf-8"?>
+<p:notes xmlns:a="http://schemas.openxmlformats.org/drawingml/2006/main" xmlns:r="http://schemas.openxmlformats.org/officeDocument/2006/relationships" xmlns:p="http://schemas.openxmlformats.org/presentationml/2006/main">
+  <p:cSld>
+    <p:spTree>
+      <p:nvGrpSpPr>
+        <p:cNvPr id="1" name=""/>
+        <p:cNvGrpSpPr/>
+        <p:nvPr/>
+      </p:nvGrpSpPr>
+      <p:grpSpPr>
+        <a:xfrm>
+          <a:off x="0" y="0"/>
+          <a:ext cx="0" cy="0"/>
+          <a:chOff x="0" y="0"/>
+          <a:chExt cx="0" cy="0"/>
+        </a:xfrm>
+      </p:grpSpPr>
+      <p:sp>
+        <p:nvSpPr>
+          <p:cNvPr id="2" name="Slide Image Placeholder 1"/>
+          <p:cNvSpPr>
+            <a:spLocks noGrp="1" noRot="1" noChangeAspect="1"/>
+          </p:cNvSpPr>
+          <p:nvPr>
+            <p:ph type="sldImg"/>
+          </p:nvPr>
+        </p:nvSpPr>
+        <p:spPr/>
+      </p:sp>
+      <p:sp>
+        <p:nvSpPr>
+          <p:cNvPr id="3" name="Notes Placeholder 2"/>
+          <p:cNvSpPr>
+            <a:spLocks noGrp="1"/>
+          </p:cNvSpPr>
+          <p:nvPr>
+            <p:ph type="body" idx="1"/>
+          </p:nvPr>
+        </p:nvSpPr>
+        <p:spPr/>
+        <p:txBody>
+          <a:bodyPr/>
+          <a:lstStyle/>
+          <a:p>
+            <a:endParaRPr lang="en-US"/>
+          </a:p>
+        </p:txBody>
+      </p:sp>
+      <p:sp>
+        <p:nvSpPr>
+          <p:cNvPr id="4" name="Slide Number Placeholder 3"/>
+          <p:cNvSpPr>
+            <a:spLocks noGrp="1"/>
+          </p:cNvSpPr>
+          <p:nvPr>
+            <p:ph type="sldNum" sz="quarter" idx="5"/>
+          </p:nvPr>
+        </p:nvSpPr>
+        <p:spPr/>
+        <p:txBody>
+          <a:bodyPr/>
+          <a:lstStyle/>
+          <a:p>
+            <a:fld id="{53D823F5-FDDD-4E6F-9CBC-770E77BAD144}" type="slidenum">
+              <a:rPr lang="en-US" smtClean="0"/>
+              <a:t>6</a:t>
+            </a:fld>
+            <a:endParaRPr lang="en-US"/>
+          </a:p>
+        </p:txBody>
+      </p:sp>
+    </p:spTree>
+    <p:extLst>
+      <p:ext uri="{BB962C8B-B14F-4D97-AF65-F5344CB8AC3E}">
+        <p14:creationId xmlns:p14="http://schemas.microsoft.com/office/powerpoint/2010/main" val="3352556034"/>
+      </p:ext>
+    </p:extLst>
+  </p:cSld>
+  <p:clrMapOvr>
+    <a:masterClrMapping/>
+  </p:clrMapOvr>
+</p:notes>
+</file>
+
+<file path=ppt/notesSlides/notesSlide7.xml><?xml version="1.0" encoding="utf-8"?>
+<p:notes xmlns:a="http://schemas.openxmlformats.org/drawingml/2006/main" xmlns:r="http://schemas.openxmlformats.org/officeDocument/2006/relationships" xmlns:p="http://schemas.openxmlformats.org/presentationml/2006/main">
+  <p:cSld>
+    <p:spTree>
+      <p:nvGrpSpPr>
+        <p:cNvPr id="1" name=""/>
+        <p:cNvGrpSpPr/>
+        <p:nvPr/>
+      </p:nvGrpSpPr>
+      <p:grpSpPr>
+        <a:xfrm>
+          <a:off x="0" y="0"/>
+          <a:ext cx="0" cy="0"/>
+          <a:chOff x="0" y="0"/>
+          <a:chExt cx="0" cy="0"/>
+        </a:xfrm>
+      </p:grpSpPr>
+      <p:sp>
+        <p:nvSpPr>
+          <p:cNvPr id="2" name="Slide Image Placeholder 1"/>
+          <p:cNvSpPr>
+            <a:spLocks noGrp="1" noRot="1" noChangeAspect="1"/>
+          </p:cNvSpPr>
+          <p:nvPr>
+            <p:ph type="sldImg"/>
+          </p:nvPr>
+        </p:nvSpPr>
+        <p:spPr/>
+      </p:sp>
+      <p:sp>
+        <p:nvSpPr>
+          <p:cNvPr id="3" name="Notes Placeholder 2"/>
+          <p:cNvSpPr>
+            <a:spLocks noGrp="1"/>
+          </p:cNvSpPr>
+          <p:nvPr>
+            <p:ph type="body" idx="1"/>
+          </p:nvPr>
+        </p:nvSpPr>
+        <p:spPr/>
+        <p:txBody>
+          <a:bodyPr/>
+          <a:lstStyle/>
+          <a:p>
+            <a:endParaRPr lang="en-US"/>
+          </a:p>
+        </p:txBody>
+      </p:sp>
+      <p:sp>
+        <p:nvSpPr>
+          <p:cNvPr id="4" name="Slide Number Placeholder 3"/>
+          <p:cNvSpPr>
+            <a:spLocks noGrp="1"/>
+          </p:cNvSpPr>
+          <p:nvPr>
+            <p:ph type="sldNum" sz="quarter" idx="5"/>
+          </p:nvPr>
+        </p:nvSpPr>
+        <p:spPr/>
+        <p:txBody>
+          <a:bodyPr/>
+          <a:lstStyle/>
+          <a:p>
+            <a:fld id="{53D823F5-FDDD-4E6F-9CBC-770E77BAD144}" type="slidenum">
+              <a:rPr lang="en-US" smtClean="0"/>
+              <a:t>7</a:t>
+            </a:fld>
+            <a:endParaRPr lang="en-US"/>
+          </a:p>
+        </p:txBody>
+      </p:sp>
+    </p:spTree>
+    <p:extLst>
+      <p:ext uri="{BB962C8B-B14F-4D97-AF65-F5344CB8AC3E}">
+        <p14:creationId xmlns:p14="http://schemas.microsoft.com/office/powerpoint/2010/main" val="3221929950"/>
+      </p:ext>
+    </p:extLst>
+  </p:cSld>
+  <p:clrMapOvr>
+    <a:masterClrMapping/>
+  </p:clrMapOvr>
+</p:notes>
+</file>
+
+<file path=ppt/notesSlides/notesSlide8.xml><?xml version="1.0" encoding="utf-8"?>
+<p:notes xmlns:a="http://schemas.openxmlformats.org/drawingml/2006/main" xmlns:r="http://schemas.openxmlformats.org/officeDocument/2006/relationships" xmlns:p="http://schemas.openxmlformats.org/presentationml/2006/main">
+  <p:cSld>
+    <p:spTree>
+      <p:nvGrpSpPr>
+        <p:cNvPr id="1" name=""/>
+        <p:cNvGrpSpPr/>
+        <p:nvPr/>
+      </p:nvGrpSpPr>
+      <p:grpSpPr>
+        <a:xfrm>
+          <a:off x="0" y="0"/>
+          <a:ext cx="0" cy="0"/>
+          <a:chOff x="0" y="0"/>
+          <a:chExt cx="0" cy="0"/>
+        </a:xfrm>
+      </p:grpSpPr>
+      <p:sp>
+        <p:nvSpPr>
+          <p:cNvPr id="2" name="Slide Image Placeholder 1"/>
+          <p:cNvSpPr>
+            <a:spLocks noGrp="1" noRot="1" noChangeAspect="1"/>
+          </p:cNvSpPr>
+          <p:nvPr>
+            <p:ph type="sldImg"/>
+          </p:nvPr>
+        </p:nvSpPr>
+        <p:spPr/>
+      </p:sp>
+      <p:sp>
+        <p:nvSpPr>
+          <p:cNvPr id="3" name="Notes Placeholder 2"/>
+          <p:cNvSpPr>
+            <a:spLocks noGrp="1"/>
+          </p:cNvSpPr>
+          <p:nvPr>
+            <p:ph type="body" idx="1"/>
+          </p:nvPr>
+        </p:nvSpPr>
+        <p:spPr/>
+        <p:txBody>
+          <a:bodyPr/>
+          <a:lstStyle/>
+          <a:p>
+            <a:endParaRPr lang="en-US"/>
+          </a:p>
+        </p:txBody>
+      </p:sp>
+      <p:sp>
+        <p:nvSpPr>
+          <p:cNvPr id="4" name="Slide Number Placeholder 3"/>
+          <p:cNvSpPr>
+            <a:spLocks noGrp="1"/>
+          </p:cNvSpPr>
+          <p:nvPr>
+            <p:ph type="sldNum" sz="quarter" idx="5"/>
+          </p:nvPr>
+        </p:nvSpPr>
+        <p:spPr/>
+        <p:txBody>
+          <a:bodyPr/>
+          <a:lstStyle/>
+          <a:p>
+            <a:fld id="{53D823F5-FDDD-4E6F-9CBC-770E77BAD144}" type="slidenum">
+              <a:rPr lang="en-US" smtClean="0"/>
+              <a:t>8</a:t>
+            </a:fld>
+            <a:endParaRPr lang="en-US"/>
+          </a:p>
+        </p:txBody>
+      </p:sp>
+    </p:spTree>
+    <p:extLst>
+      <p:ext uri="{BB962C8B-B14F-4D97-AF65-F5344CB8AC3E}">
+        <p14:creationId xmlns:p14="http://schemas.microsoft.com/office/powerpoint/2010/main" val="1036520210"/>
+      </p:ext>
+    </p:extLst>
+  </p:cSld>
+  <p:clrMapOvr>
+    <a:masterClrMapping/>
+  </p:clrMapOvr>
+</p:notes>
+</file>
+
 <file path=ppt/slideLayouts/slideLayout1.xml><?xml version="1.0" encoding="utf-8"?>
 <p:sldLayout xmlns:a="http://schemas.openxmlformats.org/drawingml/2006/main" xmlns:r="http://schemas.openxmlformats.org/officeDocument/2006/relationships" xmlns:p="http://schemas.openxmlformats.org/presentationml/2006/main" type="title" preserve="1">
   <p:cSld name="Title Slide">
@@ -264,7 +1495,7 @@
           <a:p>
             <a:fld id="{2B2943D5-CB9D-448A-BA76-EF80B3FD29FD}" type="datetimeFigureOut">
               <a:rPr lang="en-US" smtClean="0"/>
-              <a:t>3/5/2019</a:t>
+              <a:t>3/6/2019</a:t>
             </a:fld>
             <a:endParaRPr lang="en-US"/>
           </a:p>
@@ -462,7 +1693,7 @@
           <a:p>
             <a:fld id="{2B2943D5-CB9D-448A-BA76-EF80B3FD29FD}" type="datetimeFigureOut">
               <a:rPr lang="en-US" smtClean="0"/>
-              <a:t>3/5/2019</a:t>
+              <a:t>3/6/2019</a:t>
             </a:fld>
             <a:endParaRPr lang="en-US"/>
           </a:p>
@@ -670,7 +1901,7 @@
           <a:p>
             <a:fld id="{2B2943D5-CB9D-448A-BA76-EF80B3FD29FD}" type="datetimeFigureOut">
               <a:rPr lang="en-US" smtClean="0"/>
-              <a:t>3/5/2019</a:t>
+              <a:t>3/6/2019</a:t>
             </a:fld>
             <a:endParaRPr lang="en-US"/>
           </a:p>
@@ -868,7 +2099,7 @@
           <a:p>
             <a:fld id="{2B2943D5-CB9D-448A-BA76-EF80B3FD29FD}" type="datetimeFigureOut">
               <a:rPr lang="en-US" smtClean="0"/>
-              <a:t>3/5/2019</a:t>
+              <a:t>3/6/2019</a:t>
             </a:fld>
             <a:endParaRPr lang="en-US"/>
           </a:p>
@@ -1143,7 +2374,7 @@
           <a:p>
             <a:fld id="{2B2943D5-CB9D-448A-BA76-EF80B3FD29FD}" type="datetimeFigureOut">
               <a:rPr lang="en-US" smtClean="0"/>
-              <a:t>3/5/2019</a:t>
+              <a:t>3/6/2019</a:t>
             </a:fld>
             <a:endParaRPr lang="en-US"/>
           </a:p>
@@ -1408,7 +2639,7 @@
           <a:p>
             <a:fld id="{2B2943D5-CB9D-448A-BA76-EF80B3FD29FD}" type="datetimeFigureOut">
               <a:rPr lang="en-US" smtClean="0"/>
-              <a:t>3/5/2019</a:t>
+              <a:t>3/6/2019</a:t>
             </a:fld>
             <a:endParaRPr lang="en-US"/>
           </a:p>
@@ -1820,7 +3051,7 @@
           <a:p>
             <a:fld id="{2B2943D5-CB9D-448A-BA76-EF80B3FD29FD}" type="datetimeFigureOut">
               <a:rPr lang="en-US" smtClean="0"/>
-              <a:t>3/5/2019</a:t>
+              <a:t>3/6/2019</a:t>
             </a:fld>
             <a:endParaRPr lang="en-US"/>
           </a:p>
@@ -1961,7 +3192,7 @@
           <a:p>
             <a:fld id="{2B2943D5-CB9D-448A-BA76-EF80B3FD29FD}" type="datetimeFigureOut">
               <a:rPr lang="en-US" smtClean="0"/>
-              <a:t>3/5/2019</a:t>
+              <a:t>3/6/2019</a:t>
             </a:fld>
             <a:endParaRPr lang="en-US"/>
           </a:p>
@@ -2074,7 +3305,7 @@
           <a:p>
             <a:fld id="{2B2943D5-CB9D-448A-BA76-EF80B3FD29FD}" type="datetimeFigureOut">
               <a:rPr lang="en-US" smtClean="0"/>
-              <a:t>3/5/2019</a:t>
+              <a:t>3/6/2019</a:t>
             </a:fld>
             <a:endParaRPr lang="en-US"/>
           </a:p>
@@ -2385,7 +3616,7 @@
           <a:p>
             <a:fld id="{2B2943D5-CB9D-448A-BA76-EF80B3FD29FD}" type="datetimeFigureOut">
               <a:rPr lang="en-US" smtClean="0"/>
-              <a:t>3/5/2019</a:t>
+              <a:t>3/6/2019</a:t>
             </a:fld>
             <a:endParaRPr lang="en-US"/>
           </a:p>
@@ -2673,7 +3904,7 @@
           <a:p>
             <a:fld id="{2B2943D5-CB9D-448A-BA76-EF80B3FD29FD}" type="datetimeFigureOut">
               <a:rPr lang="en-US" smtClean="0"/>
-              <a:t>3/5/2019</a:t>
+              <a:t>3/6/2019</a:t>
             </a:fld>
             <a:endParaRPr lang="en-US"/>
           </a:p>
@@ -2917,7 +4148,7 @@
           <a:p>
             <a:fld id="{2B2943D5-CB9D-448A-BA76-EF80B3FD29FD}" type="datetimeFigureOut">
               <a:rPr lang="en-US" smtClean="0"/>
-              <a:t>3/5/2019</a:t>
+              <a:t>3/6/2019</a:t>
             </a:fld>
             <a:endParaRPr lang="en-US"/>
           </a:p>
@@ -3853,7 +5084,7 @@
                   <a:schemeClr val="bg1"/>
                 </a:solidFill>
               </a:rPr>
-              <a:t>GLAPS (Goal)</a:t>
+              <a:t>GLAPS</a:t>
             </a:r>
           </a:p>
         </p:txBody>
@@ -3876,8 +5107,23 @@
         </p:nvSpPr>
         <p:spPr/>
         <p:txBody>
-          <a:bodyPr/>
-          <a:lstStyle/>
+          <a:bodyPr>
+            <a:normAutofit lnSpcReduction="10000"/>
+          </a:bodyPr>
+          <a:lstStyle/>
+          <a:p>
+            <a:pPr marL="0" indent="0">
+              <a:buNone/>
+            </a:pPr>
+            <a:r>
+              <a:rPr lang="en-US" u="sng" dirty="0">
+                <a:solidFill>
+                  <a:schemeClr val="bg1"/>
+                </a:solidFill>
+              </a:rPr>
+              <a:t>Goal:</a:t>
+            </a:r>
+          </a:p>
           <a:p>
             <a:pPr marL="0" indent="0">
               <a:buNone/>
@@ -3895,16 +5141,6 @@
             <a:pPr marL="0" indent="0">
               <a:buNone/>
             </a:pPr>
-            <a:endParaRPr lang="en-US" dirty="0">
-              <a:solidFill>
-                <a:schemeClr val="bg1"/>
-              </a:solidFill>
-            </a:endParaRPr>
-          </a:p>
-          <a:p>
-            <a:pPr marL="0" indent="0">
-              <a:buNone/>
-            </a:pPr>
             <a:r>
               <a:rPr lang="en-US" dirty="0">
                 <a:solidFill>
@@ -3913,6 +5149,52 @@
               </a:rPr>
               <a:t>The user will enter an address and current home value, then select the type of facility and the number of years in the future for which they wish to view the predicted property value.</a:t>
             </a:r>
+          </a:p>
+          <a:p>
+            <a:pPr marL="0" indent="0">
+              <a:buNone/>
+            </a:pPr>
+            <a:endParaRPr lang="en-US" dirty="0">
+              <a:solidFill>
+                <a:schemeClr val="bg1"/>
+              </a:solidFill>
+            </a:endParaRPr>
+          </a:p>
+          <a:p>
+            <a:pPr marL="0" indent="0">
+              <a:buNone/>
+            </a:pPr>
+            <a:r>
+              <a:rPr lang="en-US" u="sng" dirty="0">
+                <a:solidFill>
+                  <a:schemeClr val="bg1"/>
+                </a:solidFill>
+              </a:rPr>
+              <a:t>Minimum Viable Product:</a:t>
+            </a:r>
+          </a:p>
+          <a:p>
+            <a:pPr marL="0" indent="0">
+              <a:buNone/>
+            </a:pPr>
+            <a:r>
+              <a:rPr lang="en-US" dirty="0">
+                <a:solidFill>
+                  <a:schemeClr val="bg1"/>
+                </a:solidFill>
+              </a:rPr>
+              <a:t>Our software will be able to predict future values of houses based on the current factors in a specific county. </a:t>
+            </a:r>
+          </a:p>
+          <a:p>
+            <a:pPr marL="0" indent="0">
+              <a:buNone/>
+            </a:pPr>
+            <a:endParaRPr lang="en-US" dirty="0">
+              <a:solidFill>
+                <a:schemeClr val="bg1"/>
+              </a:solidFill>
+            </a:endParaRPr>
           </a:p>
           <a:p>
             <a:pPr marL="0" indent="0">
@@ -3993,7 +5275,7 @@
                   <a:schemeClr val="bg1"/>
                 </a:solidFill>
               </a:rPr>
-              <a:t>Minimum Shippable Product</a:t>
+              <a:t>Data Collection</a:t>
             </a:r>
           </a:p>
         </p:txBody>
@@ -4014,7 +5296,12 @@
             <p:ph idx="1"/>
           </p:nvPr>
         </p:nvSpPr>
-        <p:spPr/>
+        <p:spPr>
+          <a:xfrm>
+            <a:off x="838200" y="1825625"/>
+            <a:ext cx="10515600" cy="4351338"/>
+          </a:xfrm>
+        </p:spPr>
         <p:txBody>
           <a:bodyPr/>
           <a:lstStyle/>
@@ -4028,7 +5315,7 @@
                   <a:schemeClr val="bg1"/>
                 </a:solidFill>
               </a:rPr>
-              <a:t>Our software will be able to predict future values of houses based on the current factors in the county. </a:t>
+              <a:t>Our data was obtained by using the Census API</a:t>
             </a:r>
           </a:p>
           <a:p>
@@ -4051,7 +5338,7 @@
                   <a:schemeClr val="bg1"/>
                 </a:solidFill>
               </a:rPr>
-              <a:t>Or</a:t>
+              <a:t>Visualization of the Data was achieved through the use of Google Facets.</a:t>
             </a:r>
           </a:p>
           <a:p>
@@ -4074,7 +5361,7 @@
                   <a:schemeClr val="bg1"/>
                 </a:solidFill>
               </a:rPr>
-              <a:t>Our software will predict current values of houses based on current factors in the county. </a:t>
+              <a:t>https://pair-code.github.io/facets/</a:t>
             </a:r>
           </a:p>
         </p:txBody>
@@ -4141,7 +5428,7 @@
                   <a:schemeClr val="bg1"/>
                 </a:solidFill>
               </a:rPr>
-              <a:t>Software Used</a:t>
+              <a:t>Software </a:t>
             </a:r>
           </a:p>
         </p:txBody>
@@ -4165,7 +5452,7 @@
         <p:spPr/>
         <p:txBody>
           <a:bodyPr>
-            <a:normAutofit lnSpcReduction="10000"/>
+            <a:normAutofit/>
           </a:bodyPr>
           <a:lstStyle/>
           <a:p>
@@ -4238,33 +5525,12 @@
               <a:buNone/>
             </a:pPr>
             <a:r>
-              <a:rPr lang="en-US">
-                <a:solidFill>
-                  <a:schemeClr val="bg1"/>
-                </a:solidFill>
-              </a:rPr>
-              <a:t>Visualization</a:t>
-            </a:r>
-            <a:r>
               <a:rPr lang="en-US" dirty="0">
                 <a:solidFill>
                   <a:schemeClr val="bg1"/>
                 </a:solidFill>
               </a:rPr>
-              <a:t>:</a:t>
-            </a:r>
-          </a:p>
-          <a:p>
-            <a:pPr marL="0" indent="0">
-              <a:buNone/>
-            </a:pPr>
-            <a:r>
-              <a:rPr lang="en-US" dirty="0">
-                <a:solidFill>
-                  <a:schemeClr val="bg1"/>
-                </a:solidFill>
-              </a:rPr>
-              <a:t>	- Facets </a:t>
+              <a:t>Machine Learning:</a:t>
             </a:r>
           </a:p>
           <a:p>
@@ -4285,25 +5551,28 @@
                   <a:schemeClr val="bg1"/>
                 </a:solidFill>
               </a:rPr>
-              <a:t>TensorBoard</a:t>
-            </a:r>
-            <a:endParaRPr lang="en-US" dirty="0">
-              <a:solidFill>
-                <a:schemeClr val="bg1"/>
-              </a:solidFill>
-            </a:endParaRPr>
-          </a:p>
-          <a:p>
-            <a:pPr marL="0" indent="0">
-              <a:buNone/>
-            </a:pPr>
+              <a:t>Keras</a:t>
+            </a:r>
             <a:r>
               <a:rPr lang="en-US" dirty="0">
                 <a:solidFill>
                   <a:schemeClr val="bg1"/>
                 </a:solidFill>
               </a:rPr>
-              <a:t>Machine Learning:</a:t>
+              <a:t> backed with TensorFlow</a:t>
+            </a:r>
+          </a:p>
+          <a:p>
+            <a:pPr marL="0" indent="0">
+              <a:buNone/>
+            </a:pPr>
+            <a:r>
+              <a:rPr lang="en-US" dirty="0">
+                <a:solidFill>
+                  <a:schemeClr val="bg1"/>
+                </a:solidFill>
+              </a:rPr>
+              <a:t>Visualization:</a:t>
             </a:r>
           </a:p>
           <a:p>
@@ -4324,7 +5593,7 @@
                   <a:schemeClr val="bg1"/>
                 </a:solidFill>
               </a:rPr>
-              <a:t>Keras</a:t>
+              <a:t>TensorBoard</a:t>
             </a:r>
             <a:r>
               <a:rPr lang="en-US" dirty="0">
@@ -4332,18 +5601,8 @@
                   <a:schemeClr val="bg1"/>
                 </a:solidFill>
               </a:rPr>
-              <a:t> backed with TensorFlow</a:t>
-            </a:r>
-          </a:p>
-          <a:p>
-            <a:pPr marL="0" indent="0">
-              <a:buNone/>
-            </a:pPr>
-            <a:endParaRPr lang="en-US" dirty="0">
-              <a:solidFill>
-                <a:schemeClr val="bg1"/>
-              </a:solidFill>
-            </a:endParaRPr>
+              <a:t> </a:t>
+            </a:r>
           </a:p>
         </p:txBody>
       </p:sp>
@@ -4351,6 +5610,313 @@
     <p:extLst>
       <p:ext uri="{BB962C8B-B14F-4D97-AF65-F5344CB8AC3E}">
         <p14:creationId xmlns:p14="http://schemas.microsoft.com/office/powerpoint/2010/main" val="312691985"/>
+      </p:ext>
+    </p:extLst>
+  </p:cSld>
+  <p:clrMapOvr>
+    <a:masterClrMapping/>
+  </p:clrMapOvr>
+</p:sld>
+</file>
+
+<file path=ppt/slides/slide7.xml><?xml version="1.0" encoding="utf-8"?>
+<p:sld xmlns:a="http://schemas.openxmlformats.org/drawingml/2006/main" xmlns:r="http://schemas.openxmlformats.org/officeDocument/2006/relationships" xmlns:p="http://schemas.openxmlformats.org/presentationml/2006/main">
+  <p:cSld>
+    <p:spTree>
+      <p:nvGrpSpPr>
+        <p:cNvPr id="1" name=""/>
+        <p:cNvGrpSpPr/>
+        <p:nvPr/>
+      </p:nvGrpSpPr>
+      <p:grpSpPr>
+        <a:xfrm>
+          <a:off x="0" y="0"/>
+          <a:ext cx="0" cy="0"/>
+          <a:chOff x="0" y="0"/>
+          <a:chExt cx="0" cy="0"/>
+        </a:xfrm>
+      </p:grpSpPr>
+      <p:sp>
+        <p:nvSpPr>
+          <p:cNvPr id="2" name="Title 1">
+            <a:extLst>
+              <a:ext uri="{FF2B5EF4-FFF2-40B4-BE49-F238E27FC236}">
+                <a16:creationId xmlns:a16="http://schemas.microsoft.com/office/drawing/2014/main" id="{3224F8B1-9EF6-4486-B531-014DA4576B4C}"/>
+              </a:ext>
+            </a:extLst>
+          </p:cNvPr>
+          <p:cNvSpPr>
+            <a:spLocks noGrp="1"/>
+          </p:cNvSpPr>
+          <p:nvPr>
+            <p:ph type="title"/>
+          </p:nvPr>
+        </p:nvSpPr>
+        <p:spPr/>
+        <p:txBody>
+          <a:bodyPr/>
+          <a:lstStyle/>
+          <a:p>
+            <a:r>
+              <a:rPr lang="en-US" dirty="0" err="1">
+                <a:solidFill>
+                  <a:schemeClr val="bg1"/>
+                </a:solidFill>
+              </a:rPr>
+              <a:t>TensorBoard</a:t>
+            </a:r>
+            <a:r>
+              <a:rPr lang="en-US" dirty="0">
+                <a:solidFill>
+                  <a:schemeClr val="bg1"/>
+                </a:solidFill>
+              </a:rPr>
+              <a:t> Model </a:t>
+            </a:r>
+          </a:p>
+        </p:txBody>
+      </p:sp>
+      <p:pic>
+        <p:nvPicPr>
+          <p:cNvPr id="8" name="Content Placeholder 7">
+            <a:extLst>
+              <a:ext uri="{FF2B5EF4-FFF2-40B4-BE49-F238E27FC236}">
+                <a16:creationId xmlns:a16="http://schemas.microsoft.com/office/drawing/2014/main" id="{E73C8FE6-BA87-4EC6-A215-441512662F49}"/>
+              </a:ext>
+            </a:extLst>
+          </p:cNvPr>
+          <p:cNvPicPr>
+            <a:picLocks noGrp="1" noChangeAspect="1"/>
+          </p:cNvPicPr>
+          <p:nvPr>
+            <p:ph idx="1"/>
+          </p:nvPr>
+        </p:nvPicPr>
+        <p:blipFill>
+          <a:blip r:embed="rId3">
+            <a:extLst>
+              <a:ext uri="{28A0092B-C50C-407E-A947-70E740481C1C}">
+                <a14:useLocalDpi xmlns:a14="http://schemas.microsoft.com/office/drawing/2010/main" val="0"/>
+              </a:ext>
+            </a:extLst>
+          </a:blip>
+          <a:stretch>
+            <a:fillRect/>
+          </a:stretch>
+        </p:blipFill>
+        <p:spPr>
+          <a:xfrm>
+            <a:off x="2875722" y="1407311"/>
+            <a:ext cx="6313429" cy="5085564"/>
+          </a:xfrm>
+        </p:spPr>
+      </p:pic>
+    </p:spTree>
+    <p:extLst>
+      <p:ext uri="{BB962C8B-B14F-4D97-AF65-F5344CB8AC3E}">
+        <p14:creationId xmlns:p14="http://schemas.microsoft.com/office/powerpoint/2010/main" val="3190345273"/>
+      </p:ext>
+    </p:extLst>
+  </p:cSld>
+  <p:clrMapOvr>
+    <a:masterClrMapping/>
+  </p:clrMapOvr>
+</p:sld>
+</file>
+
+<file path=ppt/slides/slide8.xml><?xml version="1.0" encoding="utf-8"?>
+<p:sld xmlns:a="http://schemas.openxmlformats.org/drawingml/2006/main" xmlns:r="http://schemas.openxmlformats.org/officeDocument/2006/relationships" xmlns:p="http://schemas.openxmlformats.org/presentationml/2006/main">
+  <p:cSld>
+    <p:spTree>
+      <p:nvGrpSpPr>
+        <p:cNvPr id="1" name=""/>
+        <p:cNvGrpSpPr/>
+        <p:nvPr/>
+      </p:nvGrpSpPr>
+      <p:grpSpPr>
+        <a:xfrm>
+          <a:off x="0" y="0"/>
+          <a:ext cx="0" cy="0"/>
+          <a:chOff x="0" y="0"/>
+          <a:chExt cx="0" cy="0"/>
+        </a:xfrm>
+      </p:grpSpPr>
+      <p:sp>
+        <p:nvSpPr>
+          <p:cNvPr id="2" name="Title 1">
+            <a:extLst>
+              <a:ext uri="{FF2B5EF4-FFF2-40B4-BE49-F238E27FC236}">
+                <a16:creationId xmlns:a16="http://schemas.microsoft.com/office/drawing/2014/main" id="{5FDDAA3C-F3C8-4DDB-80B9-DA237F3F4532}"/>
+              </a:ext>
+            </a:extLst>
+          </p:cNvPr>
+          <p:cNvSpPr>
+            <a:spLocks noGrp="1"/>
+          </p:cNvSpPr>
+          <p:nvPr>
+            <p:ph type="title"/>
+          </p:nvPr>
+        </p:nvSpPr>
+        <p:spPr/>
+        <p:txBody>
+          <a:bodyPr/>
+          <a:lstStyle/>
+          <a:p>
+            <a:r>
+              <a:rPr lang="en-US" dirty="0" err="1">
+                <a:solidFill>
+                  <a:schemeClr val="bg1"/>
+                </a:solidFill>
+              </a:rPr>
+              <a:t>TensorBoard</a:t>
+            </a:r>
+            <a:r>
+              <a:rPr lang="en-US" dirty="0">
+                <a:solidFill>
+                  <a:schemeClr val="bg1"/>
+                </a:solidFill>
+              </a:rPr>
+              <a:t> Runs</a:t>
+            </a:r>
+          </a:p>
+        </p:txBody>
+      </p:sp>
+      <p:pic>
+        <p:nvPicPr>
+          <p:cNvPr id="4" name="Content Placeholder 4">
+            <a:extLst>
+              <a:ext uri="{FF2B5EF4-FFF2-40B4-BE49-F238E27FC236}">
+                <a16:creationId xmlns:a16="http://schemas.microsoft.com/office/drawing/2014/main" id="{2EE52E5D-8525-4411-A8CC-BBD8276B611D}"/>
+              </a:ext>
+            </a:extLst>
+          </p:cNvPr>
+          <p:cNvPicPr>
+            <a:picLocks noGrp="1" noChangeAspect="1"/>
+          </p:cNvPicPr>
+          <p:nvPr>
+            <p:ph idx="1"/>
+          </p:nvPr>
+        </p:nvPicPr>
+        <p:blipFill>
+          <a:blip r:embed="rId3">
+            <a:extLst>
+              <a:ext uri="{28A0092B-C50C-407E-A947-70E740481C1C}">
+                <a14:useLocalDpi xmlns:a14="http://schemas.microsoft.com/office/drawing/2010/main" val="0"/>
+              </a:ext>
+            </a:extLst>
+          </a:blip>
+          <a:stretch>
+            <a:fillRect/>
+          </a:stretch>
+        </p:blipFill>
+        <p:spPr>
+          <a:xfrm>
+            <a:off x="2045219" y="1825625"/>
+            <a:ext cx="8101562" cy="4351338"/>
+          </a:xfrm>
+        </p:spPr>
+      </p:pic>
+    </p:spTree>
+    <p:extLst>
+      <p:ext uri="{BB962C8B-B14F-4D97-AF65-F5344CB8AC3E}">
+        <p14:creationId xmlns:p14="http://schemas.microsoft.com/office/powerpoint/2010/main" val="1373218052"/>
+      </p:ext>
+    </p:extLst>
+  </p:cSld>
+  <p:clrMapOvr>
+    <a:masterClrMapping/>
+  </p:clrMapOvr>
+</p:sld>
+</file>
+
+<file path=ppt/slides/slide9.xml><?xml version="1.0" encoding="utf-8"?>
+<p:sld xmlns:a="http://schemas.openxmlformats.org/drawingml/2006/main" xmlns:r="http://schemas.openxmlformats.org/officeDocument/2006/relationships" xmlns:p="http://schemas.openxmlformats.org/presentationml/2006/main">
+  <p:cSld>
+    <p:spTree>
+      <p:nvGrpSpPr>
+        <p:cNvPr id="1" name=""/>
+        <p:cNvGrpSpPr/>
+        <p:nvPr/>
+      </p:nvGrpSpPr>
+      <p:grpSpPr>
+        <a:xfrm>
+          <a:off x="0" y="0"/>
+          <a:ext cx="0" cy="0"/>
+          <a:chOff x="0" y="0"/>
+          <a:chExt cx="0" cy="0"/>
+        </a:xfrm>
+      </p:grpSpPr>
+      <p:sp>
+        <p:nvSpPr>
+          <p:cNvPr id="2" name="Title 1">
+            <a:extLst>
+              <a:ext uri="{FF2B5EF4-FFF2-40B4-BE49-F238E27FC236}">
+                <a16:creationId xmlns:a16="http://schemas.microsoft.com/office/drawing/2014/main" id="{916DCDC0-B1FB-4698-B0C9-F5C6F4B9536B}"/>
+              </a:ext>
+            </a:extLst>
+          </p:cNvPr>
+          <p:cNvSpPr>
+            <a:spLocks noGrp="1"/>
+          </p:cNvSpPr>
+          <p:nvPr>
+            <p:ph type="title"/>
+          </p:nvPr>
+        </p:nvSpPr>
+        <p:spPr/>
+        <p:txBody>
+          <a:bodyPr/>
+          <a:lstStyle/>
+          <a:p>
+            <a:r>
+              <a:rPr lang="en-US" dirty="0">
+                <a:solidFill>
+                  <a:schemeClr val="bg1"/>
+                </a:solidFill>
+              </a:rPr>
+              <a:t>Going Forward</a:t>
+            </a:r>
+          </a:p>
+        </p:txBody>
+      </p:sp>
+      <p:sp>
+        <p:nvSpPr>
+          <p:cNvPr id="3" name="Content Placeholder 2">
+            <a:extLst>
+              <a:ext uri="{FF2B5EF4-FFF2-40B4-BE49-F238E27FC236}">
+                <a16:creationId xmlns:a16="http://schemas.microsoft.com/office/drawing/2014/main" id="{54A700F1-AD0B-49FB-871D-C006332247C0}"/>
+              </a:ext>
+            </a:extLst>
+          </p:cNvPr>
+          <p:cNvSpPr>
+            <a:spLocks noGrp="1"/>
+          </p:cNvSpPr>
+          <p:nvPr>
+            <p:ph idx="1"/>
+          </p:nvPr>
+        </p:nvSpPr>
+        <p:spPr/>
+        <p:txBody>
+          <a:bodyPr/>
+          <a:lstStyle/>
+          <a:p>
+            <a:pPr marL="0" indent="0">
+              <a:buNone/>
+            </a:pPr>
+            <a:r>
+              <a:rPr lang="en-US" dirty="0">
+                <a:solidFill>
+                  <a:schemeClr val="bg1"/>
+                </a:solidFill>
+              </a:rPr>
+              <a:t>Switching from current home value predictions to future home value predictions</a:t>
+            </a:r>
+          </a:p>
+        </p:txBody>
+      </p:sp>
+    </p:spTree>
+    <p:extLst>
+      <p:ext uri="{BB962C8B-B14F-4D97-AF65-F5344CB8AC3E}">
+        <p14:creationId xmlns:p14="http://schemas.microsoft.com/office/powerpoint/2010/main" val="1964266525"/>
       </p:ext>
     </p:extLst>
   </p:cSld>
@@ -4653,4 +6219,594 @@
     </a:ext>
   </a:extLst>
 </a:theme>
+</file>
+
+<file path=ppt/theme/theme2.xml><?xml version="1.0" encoding="utf-8"?>
+<a:theme xmlns:a="http://schemas.openxmlformats.org/drawingml/2006/main" name="Office Theme">
+  <a:themeElements>
+    <a:clrScheme name="Office">
+      <a:dk1>
+        <a:sysClr val="windowText" lastClr="000000"/>
+      </a:dk1>
+      <a:lt1>
+        <a:sysClr val="window" lastClr="FFFFFF"/>
+      </a:lt1>
+      <a:dk2>
+        <a:srgbClr val="44546A"/>
+      </a:dk2>
+      <a:lt2>
+        <a:srgbClr val="E7E6E6"/>
+      </a:lt2>
+      <a:accent1>
+        <a:srgbClr val="4472C4"/>
+      </a:accent1>
+      <a:accent2>
+        <a:srgbClr val="ED7D31"/>
+      </a:accent2>
+      <a:accent3>
+        <a:srgbClr val="A5A5A5"/>
+      </a:accent3>
+      <a:accent4>
+        <a:srgbClr val="FFC000"/>
+      </a:accent4>
+      <a:accent5>
+        <a:srgbClr val="5B9BD5"/>
+      </a:accent5>
+      <a:accent6>
+        <a:srgbClr val="70AD47"/>
+      </a:accent6>
+      <a:hlink>
+        <a:srgbClr val="0563C1"/>
+      </a:hlink>
+      <a:folHlink>
+        <a:srgbClr val="954F72"/>
+      </a:folHlink>
+    </a:clrScheme>
+    <a:fontScheme name="Office">
+      <a:majorFont>
+        <a:latin typeface="Calibri Light" panose="020F0302020204030204"/>
+        <a:ea typeface=""/>
+        <a:cs typeface=""/>
+        <a:font script="Jpan" typeface="游ゴシック Light"/>
+        <a:font script="Hang" typeface="맑은 고딕"/>
+        <a:font script="Hans" typeface="等线 Light"/>
+        <a:font script="Hant" typeface="新細明體"/>
+        <a:font script="Arab" typeface="Times New Roman"/>
+        <a:font script="Hebr" typeface="Times New Roman"/>
+        <a:font script="Thai" typeface="Angsana New"/>
+        <a:font script="Ethi" typeface="Nyala"/>
+        <a:font script="Beng" typeface="Vrinda"/>
+        <a:font script="Gujr" typeface="Shruti"/>
+        <a:font script="Khmr" typeface="MoolBoran"/>
+        <a:font script="Knda" typeface="Tunga"/>
+        <a:font script="Guru" typeface="Raavi"/>
+        <a:font script="Cans" typeface="Euphemia"/>
+        <a:font script="Cher" typeface="Plantagenet Cherokee"/>
+        <a:font script="Yiii" typeface="Microsoft Yi Baiti"/>
+        <a:font script="Tibt" typeface="Microsoft Himalaya"/>
+        <a:font script="Thaa" typeface="MV Boli"/>
+        <a:font script="Deva" typeface="Mangal"/>
+        <a:font script="Telu" typeface="Gautami"/>
+        <a:font script="Taml" typeface="Latha"/>
+        <a:font script="Syrc" typeface="Estrangelo Edessa"/>
+        <a:font script="Orya" typeface="Kalinga"/>
+        <a:font script="Mlym" typeface="Kartika"/>
+        <a:font script="Laoo" typeface="DokChampa"/>
+        <a:font script="Sinh" typeface="Iskoola Pota"/>
+        <a:font script="Mong" typeface="Mongolian Baiti"/>
+        <a:font script="Viet" typeface="Times New Roman"/>
+        <a:font script="Uigh" typeface="Microsoft Uighur"/>
+        <a:font script="Geor" typeface="Sylfaen"/>
+        <a:font script="Armn" typeface="Arial"/>
+        <a:font script="Bugi" typeface="Leelawadee UI"/>
+        <a:font script="Bopo" typeface="Microsoft JhengHei"/>
+        <a:font script="Java" typeface="Javanese Text"/>
+        <a:font script="Lisu" typeface="Segoe UI"/>
+        <a:font script="Mymr" typeface="Myanmar Text"/>
+        <a:font script="Nkoo" typeface="Ebrima"/>
+        <a:font script="Olck" typeface="Nirmala UI"/>
+        <a:font script="Osma" typeface="Ebrima"/>
+        <a:font script="Phag" typeface="Phagspa"/>
+        <a:font script="Syrn" typeface="Estrangelo Edessa"/>
+        <a:font script="Syrj" typeface="Estrangelo Edessa"/>
+        <a:font script="Syre" typeface="Estrangelo Edessa"/>
+        <a:font script="Sora" typeface="Nirmala UI"/>
+        <a:font script="Tale" typeface="Microsoft Tai Le"/>
+        <a:font script="Talu" typeface="Microsoft New Tai Lue"/>
+        <a:font script="Tfng" typeface="Ebrima"/>
+      </a:majorFont>
+      <a:minorFont>
+        <a:latin typeface="Calibri" panose="020F0502020204030204"/>
+        <a:ea typeface=""/>
+        <a:cs typeface=""/>
+        <a:font script="Jpan" typeface="游ゴシック"/>
+        <a:font script="Hang" typeface="맑은 고딕"/>
+        <a:font script="Hans" typeface="等线"/>
+        <a:font script="Hant" typeface="新細明體"/>
+        <a:font script="Arab" typeface="Arial"/>
+        <a:font script="Hebr" typeface="Arial"/>
+        <a:font script="Thai" typeface="Cordia New"/>
+        <a:font script="Ethi" typeface="Nyala"/>
+        <a:font script="Beng" typeface="Vrinda"/>
+        <a:font script="Gujr" typeface="Shruti"/>
+        <a:font script="Khmr" typeface="DaunPenh"/>
+        <a:font script="Knda" typeface="Tunga"/>
+        <a:font script="Guru" typeface="Raavi"/>
+        <a:font script="Cans" typeface="Euphemia"/>
+        <a:font script="Cher" typeface="Plantagenet Cherokee"/>
+        <a:font script="Yiii" typeface="Microsoft Yi Baiti"/>
+        <a:font script="Tibt" typeface="Microsoft Himalaya"/>
+        <a:font script="Thaa" typeface="MV Boli"/>
+        <a:font script="Deva" typeface="Mangal"/>
+        <a:font script="Telu" typeface="Gautami"/>
+        <a:font script="Taml" typeface="Latha"/>
+        <a:font script="Syrc" typeface="Estrangelo Edessa"/>
+        <a:font script="Orya" typeface="Kalinga"/>
+        <a:font script="Mlym" typeface="Kartika"/>
+        <a:font script="Laoo" typeface="DokChampa"/>
+        <a:font script="Sinh" typeface="Iskoola Pota"/>
+        <a:font script="Mong" typeface="Mongolian Baiti"/>
+        <a:font script="Viet" typeface="Arial"/>
+        <a:font script="Uigh" typeface="Microsoft Uighur"/>
+        <a:font script="Geor" typeface="Sylfaen"/>
+        <a:font script="Armn" typeface="Arial"/>
+        <a:font script="Bugi" typeface="Leelawadee UI"/>
+        <a:font script="Bopo" typeface="Microsoft JhengHei"/>
+        <a:font script="Java" typeface="Javanese Text"/>
+        <a:font script="Lisu" typeface="Segoe UI"/>
+        <a:font script="Mymr" typeface="Myanmar Text"/>
+        <a:font script="Nkoo" typeface="Ebrima"/>
+        <a:font script="Olck" typeface="Nirmala UI"/>
+        <a:font script="Osma" typeface="Ebrima"/>
+        <a:font script="Phag" typeface="Phagspa"/>
+        <a:font script="Syrn" typeface="Estrangelo Edessa"/>
+        <a:font script="Syrj" typeface="Estrangelo Edessa"/>
+        <a:font script="Syre" typeface="Estrangelo Edessa"/>
+        <a:font script="Sora" typeface="Nirmala UI"/>
+        <a:font script="Tale" typeface="Microsoft Tai Le"/>
+        <a:font script="Talu" typeface="Microsoft New Tai Lue"/>
+        <a:font script="Tfng" typeface="Ebrima"/>
+      </a:minorFont>
+    </a:fontScheme>
+    <a:fmtScheme name="Office">
+      <a:fillStyleLst>
+        <a:solidFill>
+          <a:schemeClr val="phClr"/>
+        </a:solidFill>
+        <a:gradFill rotWithShape="1">
+          <a:gsLst>
+            <a:gs pos="0">
+              <a:schemeClr val="phClr">
+                <a:lumMod val="110000"/>
+                <a:satMod val="105000"/>
+                <a:tint val="67000"/>
+              </a:schemeClr>
+            </a:gs>
+            <a:gs pos="50000">
+              <a:schemeClr val="phClr">
+                <a:lumMod val="105000"/>
+                <a:satMod val="103000"/>
+                <a:tint val="73000"/>
+              </a:schemeClr>
+            </a:gs>
+            <a:gs pos="100000">
+              <a:schemeClr val="phClr">
+                <a:lumMod val="105000"/>
+                <a:satMod val="109000"/>
+                <a:tint val="81000"/>
+              </a:schemeClr>
+            </a:gs>
+          </a:gsLst>
+          <a:lin ang="5400000" scaled="0"/>
+        </a:gradFill>
+        <a:gradFill rotWithShape="1">
+          <a:gsLst>
+            <a:gs pos="0">
+              <a:schemeClr val="phClr">
+                <a:satMod val="103000"/>
+                <a:lumMod val="102000"/>
+                <a:tint val="94000"/>
+              </a:schemeClr>
+            </a:gs>
+            <a:gs pos="50000">
+              <a:schemeClr val="phClr">
+                <a:satMod val="110000"/>
+                <a:lumMod val="100000"/>
+                <a:shade val="100000"/>
+              </a:schemeClr>
+            </a:gs>
+            <a:gs pos="100000">
+              <a:schemeClr val="phClr">
+                <a:lumMod val="99000"/>
+                <a:satMod val="120000"/>
+                <a:shade val="78000"/>
+              </a:schemeClr>
+            </a:gs>
+          </a:gsLst>
+          <a:lin ang="5400000" scaled="0"/>
+        </a:gradFill>
+      </a:fillStyleLst>
+      <a:lnStyleLst>
+        <a:ln w="6350" cap="flat" cmpd="sng" algn="ctr">
+          <a:solidFill>
+            <a:schemeClr val="phClr"/>
+          </a:solidFill>
+          <a:prstDash val="solid"/>
+          <a:miter lim="800000"/>
+        </a:ln>
+        <a:ln w="12700" cap="flat" cmpd="sng" algn="ctr">
+          <a:solidFill>
+            <a:schemeClr val="phClr"/>
+          </a:solidFill>
+          <a:prstDash val="solid"/>
+          <a:miter lim="800000"/>
+        </a:ln>
+        <a:ln w="19050" cap="flat" cmpd="sng" algn="ctr">
+          <a:solidFill>
+            <a:schemeClr val="phClr"/>
+          </a:solidFill>
+          <a:prstDash val="solid"/>
+          <a:miter lim="800000"/>
+        </a:ln>
+      </a:lnStyleLst>
+      <a:effectStyleLst>
+        <a:effectStyle>
+          <a:effectLst/>
+        </a:effectStyle>
+        <a:effectStyle>
+          <a:effectLst/>
+        </a:effectStyle>
+        <a:effectStyle>
+          <a:effectLst>
+            <a:outerShdw blurRad="57150" dist="19050" dir="5400000" algn="ctr" rotWithShape="0">
+              <a:srgbClr val="000000">
+                <a:alpha val="63000"/>
+              </a:srgbClr>
+            </a:outerShdw>
+          </a:effectLst>
+        </a:effectStyle>
+      </a:effectStyleLst>
+      <a:bgFillStyleLst>
+        <a:solidFill>
+          <a:schemeClr val="phClr"/>
+        </a:solidFill>
+        <a:solidFill>
+          <a:schemeClr val="phClr">
+            <a:tint val="95000"/>
+            <a:satMod val="170000"/>
+          </a:schemeClr>
+        </a:solidFill>
+        <a:gradFill rotWithShape="1">
+          <a:gsLst>
+            <a:gs pos="0">
+              <a:schemeClr val="phClr">
+                <a:tint val="93000"/>
+                <a:satMod val="150000"/>
+                <a:shade val="98000"/>
+                <a:lumMod val="102000"/>
+              </a:schemeClr>
+            </a:gs>
+            <a:gs pos="50000">
+              <a:schemeClr val="phClr">
+                <a:tint val="98000"/>
+                <a:satMod val="130000"/>
+                <a:shade val="90000"/>
+                <a:lumMod val="103000"/>
+              </a:schemeClr>
+            </a:gs>
+            <a:gs pos="100000">
+              <a:schemeClr val="phClr">
+                <a:shade val="63000"/>
+                <a:satMod val="120000"/>
+              </a:schemeClr>
+            </a:gs>
+          </a:gsLst>
+          <a:lin ang="5400000" scaled="0"/>
+        </a:gradFill>
+      </a:bgFillStyleLst>
+    </a:fmtScheme>
+  </a:themeElements>
+  <a:objectDefaults/>
+  <a:extraClrSchemeLst/>
+  <a:extLst>
+    <a:ext uri="{05A4C25C-085E-4340-85A3-A5531E510DB2}">
+      <thm15:themeFamily xmlns:thm15="http://schemas.microsoft.com/office/thememl/2012/main" name="Office Theme" id="{62F939B6-93AF-4DB8-9C6B-D6C7DFDC589F}" vid="{4A3C46E8-61CC-4603-A589-7422A47A8E4A}"/>
+    </a:ext>
+  </a:extLst>
+</a:theme>
+</file>
+
+<file path=ppt/theme/theme3.xml><?xml version="1.0" encoding="utf-8"?>
+<a:theme xmlns:a="http://schemas.openxmlformats.org/drawingml/2006/main" name="Office Theme">
+  <a:themeElements>
+    <a:clrScheme name="Office">
+      <a:dk1>
+        <a:sysClr val="windowText" lastClr="000000"/>
+      </a:dk1>
+      <a:lt1>
+        <a:sysClr val="window" lastClr="FFFFFF"/>
+      </a:lt1>
+      <a:dk2>
+        <a:srgbClr val="44546A"/>
+      </a:dk2>
+      <a:lt2>
+        <a:srgbClr val="E7E6E6"/>
+      </a:lt2>
+      <a:accent1>
+        <a:srgbClr val="4472C4"/>
+      </a:accent1>
+      <a:accent2>
+        <a:srgbClr val="ED7D31"/>
+      </a:accent2>
+      <a:accent3>
+        <a:srgbClr val="A5A5A5"/>
+      </a:accent3>
+      <a:accent4>
+        <a:srgbClr val="FFC000"/>
+      </a:accent4>
+      <a:accent5>
+        <a:srgbClr val="5B9BD5"/>
+      </a:accent5>
+      <a:accent6>
+        <a:srgbClr val="70AD47"/>
+      </a:accent6>
+      <a:hlink>
+        <a:srgbClr val="0563C1"/>
+      </a:hlink>
+      <a:folHlink>
+        <a:srgbClr val="954F72"/>
+      </a:folHlink>
+    </a:clrScheme>
+    <a:fontScheme name="Office">
+      <a:majorFont>
+        <a:latin typeface="Calibri Light" panose="020F0302020204030204"/>
+        <a:ea typeface=""/>
+        <a:cs typeface=""/>
+        <a:font script="Jpan" typeface="游ゴシック Light"/>
+        <a:font script="Hang" typeface="맑은 고딕"/>
+        <a:font script="Hans" typeface="等线 Light"/>
+        <a:font script="Hant" typeface="新細明體"/>
+        <a:font script="Arab" typeface="Times New Roman"/>
+        <a:font script="Hebr" typeface="Times New Roman"/>
+        <a:font script="Thai" typeface="Angsana New"/>
+        <a:font script="Ethi" typeface="Nyala"/>
+        <a:font script="Beng" typeface="Vrinda"/>
+        <a:font script="Gujr" typeface="Shruti"/>
+        <a:font script="Khmr" typeface="MoolBoran"/>
+        <a:font script="Knda" typeface="Tunga"/>
+        <a:font script="Guru" typeface="Raavi"/>
+        <a:font script="Cans" typeface="Euphemia"/>
+        <a:font script="Cher" typeface="Plantagenet Cherokee"/>
+        <a:font script="Yiii" typeface="Microsoft Yi Baiti"/>
+        <a:font script="Tibt" typeface="Microsoft Himalaya"/>
+        <a:font script="Thaa" typeface="MV Boli"/>
+        <a:font script="Deva" typeface="Mangal"/>
+        <a:font script="Telu" typeface="Gautami"/>
+        <a:font script="Taml" typeface="Latha"/>
+        <a:font script="Syrc" typeface="Estrangelo Edessa"/>
+        <a:font script="Orya" typeface="Kalinga"/>
+        <a:font script="Mlym" typeface="Kartika"/>
+        <a:font script="Laoo" typeface="DokChampa"/>
+        <a:font script="Sinh" typeface="Iskoola Pota"/>
+        <a:font script="Mong" typeface="Mongolian Baiti"/>
+        <a:font script="Viet" typeface="Times New Roman"/>
+        <a:font script="Uigh" typeface="Microsoft Uighur"/>
+        <a:font script="Geor" typeface="Sylfaen"/>
+        <a:font script="Armn" typeface="Arial"/>
+        <a:font script="Bugi" typeface="Leelawadee UI"/>
+        <a:font script="Bopo" typeface="Microsoft JhengHei"/>
+        <a:font script="Java" typeface="Javanese Text"/>
+        <a:font script="Lisu" typeface="Segoe UI"/>
+        <a:font script="Mymr" typeface="Myanmar Text"/>
+        <a:font script="Nkoo" typeface="Ebrima"/>
+        <a:font script="Olck" typeface="Nirmala UI"/>
+        <a:font script="Osma" typeface="Ebrima"/>
+        <a:font script="Phag" typeface="Phagspa"/>
+        <a:font script="Syrn" typeface="Estrangelo Edessa"/>
+        <a:font script="Syrj" typeface="Estrangelo Edessa"/>
+        <a:font script="Syre" typeface="Estrangelo Edessa"/>
+        <a:font script="Sora" typeface="Nirmala UI"/>
+        <a:font script="Tale" typeface="Microsoft Tai Le"/>
+        <a:font script="Talu" typeface="Microsoft New Tai Lue"/>
+        <a:font script="Tfng" typeface="Ebrima"/>
+      </a:majorFont>
+      <a:minorFont>
+        <a:latin typeface="Calibri" panose="020F0502020204030204"/>
+        <a:ea typeface=""/>
+        <a:cs typeface=""/>
+        <a:font script="Jpan" typeface="游ゴシック"/>
+        <a:font script="Hang" typeface="맑은 고딕"/>
+        <a:font script="Hans" typeface="等线"/>
+        <a:font script="Hant" typeface="新細明體"/>
+        <a:font script="Arab" typeface="Arial"/>
+        <a:font script="Hebr" typeface="Arial"/>
+        <a:font script="Thai" typeface="Cordia New"/>
+        <a:font script="Ethi" typeface="Nyala"/>
+        <a:font script="Beng" typeface="Vrinda"/>
+        <a:font script="Gujr" typeface="Shruti"/>
+        <a:font script="Khmr" typeface="DaunPenh"/>
+        <a:font script="Knda" typeface="Tunga"/>
+        <a:font script="Guru" typeface="Raavi"/>
+        <a:font script="Cans" typeface="Euphemia"/>
+        <a:font script="Cher" typeface="Plantagenet Cherokee"/>
+        <a:font script="Yiii" typeface="Microsoft Yi Baiti"/>
+        <a:font script="Tibt" typeface="Microsoft Himalaya"/>
+        <a:font script="Thaa" typeface="MV Boli"/>
+        <a:font script="Deva" typeface="Mangal"/>
+        <a:font script="Telu" typeface="Gautami"/>
+        <a:font script="Taml" typeface="Latha"/>
+        <a:font script="Syrc" typeface="Estrangelo Edessa"/>
+        <a:font script="Orya" typeface="Kalinga"/>
+        <a:font script="Mlym" typeface="Kartika"/>
+        <a:font script="Laoo" typeface="DokChampa"/>
+        <a:font script="Sinh" typeface="Iskoola Pota"/>
+        <a:font script="Mong" typeface="Mongolian Baiti"/>
+        <a:font script="Viet" typeface="Arial"/>
+        <a:font script="Uigh" typeface="Microsoft Uighur"/>
+        <a:font script="Geor" typeface="Sylfaen"/>
+        <a:font script="Armn" typeface="Arial"/>
+        <a:font script="Bugi" typeface="Leelawadee UI"/>
+        <a:font script="Bopo" typeface="Microsoft JhengHei"/>
+        <a:font script="Java" typeface="Javanese Text"/>
+        <a:font script="Lisu" typeface="Segoe UI"/>
+        <a:font script="Mymr" typeface="Myanmar Text"/>
+        <a:font script="Nkoo" typeface="Ebrima"/>
+        <a:font script="Olck" typeface="Nirmala UI"/>
+        <a:font script="Osma" typeface="Ebrima"/>
+        <a:font script="Phag" typeface="Phagspa"/>
+        <a:font script="Syrn" typeface="Estrangelo Edessa"/>
+        <a:font script="Syrj" typeface="Estrangelo Edessa"/>
+        <a:font script="Syre" typeface="Estrangelo Edessa"/>
+        <a:font script="Sora" typeface="Nirmala UI"/>
+        <a:font script="Tale" typeface="Microsoft Tai Le"/>
+        <a:font script="Talu" typeface="Microsoft New Tai Lue"/>
+        <a:font script="Tfng" typeface="Ebrima"/>
+      </a:minorFont>
+    </a:fontScheme>
+    <a:fmtScheme name="Office">
+      <a:fillStyleLst>
+        <a:solidFill>
+          <a:schemeClr val="phClr"/>
+        </a:solidFill>
+        <a:gradFill rotWithShape="1">
+          <a:gsLst>
+            <a:gs pos="0">
+              <a:schemeClr val="phClr">
+                <a:lumMod val="110000"/>
+                <a:satMod val="105000"/>
+                <a:tint val="67000"/>
+              </a:schemeClr>
+            </a:gs>
+            <a:gs pos="50000">
+              <a:schemeClr val="phClr">
+                <a:lumMod val="105000"/>
+                <a:satMod val="103000"/>
+                <a:tint val="73000"/>
+              </a:schemeClr>
+            </a:gs>
+            <a:gs pos="100000">
+              <a:schemeClr val="phClr">
+                <a:lumMod val="105000"/>
+                <a:satMod val="109000"/>
+                <a:tint val="81000"/>
+              </a:schemeClr>
+            </a:gs>
+          </a:gsLst>
+          <a:lin ang="5400000" scaled="0"/>
+        </a:gradFill>
+        <a:gradFill rotWithShape="1">
+          <a:gsLst>
+            <a:gs pos="0">
+              <a:schemeClr val="phClr">
+                <a:satMod val="103000"/>
+                <a:lumMod val="102000"/>
+                <a:tint val="94000"/>
+              </a:schemeClr>
+            </a:gs>
+            <a:gs pos="50000">
+              <a:schemeClr val="phClr">
+                <a:satMod val="110000"/>
+                <a:lumMod val="100000"/>
+                <a:shade val="100000"/>
+              </a:schemeClr>
+            </a:gs>
+            <a:gs pos="100000">
+              <a:schemeClr val="phClr">
+                <a:lumMod val="99000"/>
+                <a:satMod val="120000"/>
+                <a:shade val="78000"/>
+              </a:schemeClr>
+            </a:gs>
+          </a:gsLst>
+          <a:lin ang="5400000" scaled="0"/>
+        </a:gradFill>
+      </a:fillStyleLst>
+      <a:lnStyleLst>
+        <a:ln w="6350" cap="flat" cmpd="sng" algn="ctr">
+          <a:solidFill>
+            <a:schemeClr val="phClr"/>
+          </a:solidFill>
+          <a:prstDash val="solid"/>
+          <a:miter lim="800000"/>
+        </a:ln>
+        <a:ln w="12700" cap="flat" cmpd="sng" algn="ctr">
+          <a:solidFill>
+            <a:schemeClr val="phClr"/>
+          </a:solidFill>
+          <a:prstDash val="solid"/>
+          <a:miter lim="800000"/>
+        </a:ln>
+        <a:ln w="19050" cap="flat" cmpd="sng" algn="ctr">
+          <a:solidFill>
+            <a:schemeClr val="phClr"/>
+          </a:solidFill>
+          <a:prstDash val="solid"/>
+          <a:miter lim="800000"/>
+        </a:ln>
+      </a:lnStyleLst>
+      <a:effectStyleLst>
+        <a:effectStyle>
+          <a:effectLst/>
+        </a:effectStyle>
+        <a:effectStyle>
+          <a:effectLst/>
+        </a:effectStyle>
+        <a:effectStyle>
+          <a:effectLst>
+            <a:outerShdw blurRad="57150" dist="19050" dir="5400000" algn="ctr" rotWithShape="0">
+              <a:srgbClr val="000000">
+                <a:alpha val="63000"/>
+              </a:srgbClr>
+            </a:outerShdw>
+          </a:effectLst>
+        </a:effectStyle>
+      </a:effectStyleLst>
+      <a:bgFillStyleLst>
+        <a:solidFill>
+          <a:schemeClr val="phClr"/>
+        </a:solidFill>
+        <a:solidFill>
+          <a:schemeClr val="phClr">
+            <a:tint val="95000"/>
+            <a:satMod val="170000"/>
+          </a:schemeClr>
+        </a:solidFill>
+        <a:gradFill rotWithShape="1">
+          <a:gsLst>
+            <a:gs pos="0">
+              <a:schemeClr val="phClr">
+                <a:tint val="93000"/>
+                <a:satMod val="150000"/>
+                <a:shade val="98000"/>
+                <a:lumMod val="102000"/>
+              </a:schemeClr>
+            </a:gs>
+            <a:gs pos="50000">
+              <a:schemeClr val="phClr">
+                <a:tint val="98000"/>
+                <a:satMod val="130000"/>
+                <a:shade val="90000"/>
+                <a:lumMod val="103000"/>
+              </a:schemeClr>
+            </a:gs>
+            <a:gs pos="100000">
+              <a:schemeClr val="phClr">
+                <a:shade val="63000"/>
+                <a:satMod val="120000"/>
+              </a:schemeClr>
+            </a:gs>
+          </a:gsLst>
+          <a:lin ang="5400000" scaled="0"/>
+        </a:gradFill>
+      </a:bgFillStyleLst>
+    </a:fmtScheme>
+  </a:themeElements>
+  <a:objectDefaults/>
+  <a:extraClrSchemeLst/>
+  <a:extLst>
+    <a:ext uri="{05A4C25C-085E-4340-85A3-A5531E510DB2}">
+      <thm15:themeFamily xmlns:thm15="http://schemas.microsoft.com/office/thememl/2012/main" name="Office Theme" id="{62F939B6-93AF-4DB8-9C6B-D6C7DFDC589F}" vid="{4A3C46E8-61CC-4603-A589-7422A47A8E4A}"/>
+    </a:ext>
+  </a:extLst>
+</a:theme>
 </file>
</xml_diff>